<commit_message>
Review SNI execution flow diagram
</commit_message>
<xml_diff>
--- a/VEEPortingGuide/images/sni_flow.pptx
+++ b/VEEPortingGuide/images/sni_flow.pptx
@@ -208,7 +208,7 @@
           <a:p>
             <a:fld id="{FE411282-FA8B-8547-9CCE-A0E3B0DAA7C8}" type="datetimeFigureOut">
               <a:rPr lang="en-US" smtClean="0"/>
-              <a:t>4/8/20</a:t>
+              <a:t>9/20/2024</a:t>
             </a:fld>
             <a:endParaRPr lang="en-US"/>
           </a:p>
@@ -272,38 +272,37 @@
           <a:p>
             <a:pPr lvl="0"/>
             <a:r>
-              <a:rPr lang="en-US" smtClean="0"/>
+              <a:rPr lang="en-US"/>
               <a:t>Click to edit Master text styles</a:t>
             </a:r>
           </a:p>
           <a:p>
             <a:pPr lvl="1"/>
             <a:r>
-              <a:rPr lang="en-US" smtClean="0"/>
+              <a:rPr lang="en-US"/>
               <a:t>Second level</a:t>
             </a:r>
           </a:p>
           <a:p>
             <a:pPr lvl="2"/>
             <a:r>
-              <a:rPr lang="en-US" smtClean="0"/>
+              <a:rPr lang="en-US"/>
               <a:t>Third level</a:t>
             </a:r>
           </a:p>
           <a:p>
             <a:pPr lvl="3"/>
             <a:r>
-              <a:rPr lang="en-US" smtClean="0"/>
+              <a:rPr lang="en-US"/>
               <a:t>Fourth level</a:t>
             </a:r>
           </a:p>
           <a:p>
             <a:pPr lvl="4"/>
             <a:r>
-              <a:rPr lang="en-US" smtClean="0"/>
+              <a:rPr lang="en-US"/>
               <a:t>Fifth level</a:t>
             </a:r>
-            <a:endParaRPr lang="en-US"/>
           </a:p>
         </p:txBody>
       </p:sp>
@@ -582,7 +581,7 @@
           <p:cNvPr id="2" name="Title 1">
             <a:extLst>
               <a:ext uri="{FF2B5EF4-FFF2-40B4-BE49-F238E27FC236}">
-                <a16:creationId xmlns:a16="http://schemas.microsoft.com/office/drawing/2014/main" xmlns="" id="{50DDAD7A-8B52-4CAF-8C0A-F545DDC60746}"/>
+                <a16:creationId xmlns:a16="http://schemas.microsoft.com/office/drawing/2014/main" id="{50DDAD7A-8B52-4CAF-8C0A-F545DDC60746}"/>
               </a:ext>
             </a:extLst>
           </p:cNvPr>
@@ -620,7 +619,7 @@
           <p:cNvPr id="3" name="Subtitle 2">
             <a:extLst>
               <a:ext uri="{FF2B5EF4-FFF2-40B4-BE49-F238E27FC236}">
-                <a16:creationId xmlns:a16="http://schemas.microsoft.com/office/drawing/2014/main" xmlns="" id="{C4FF6F1C-0AF5-4CAD-A059-88F88E156187}"/>
+                <a16:creationId xmlns:a16="http://schemas.microsoft.com/office/drawing/2014/main" id="{C4FF6F1C-0AF5-4CAD-A059-88F88E156187}"/>
               </a:ext>
             </a:extLst>
           </p:cNvPr>
@@ -691,7 +690,7 @@
           <p:cNvPr id="4" name="Date Placeholder 3">
             <a:extLst>
               <a:ext uri="{FF2B5EF4-FFF2-40B4-BE49-F238E27FC236}">
-                <a16:creationId xmlns:a16="http://schemas.microsoft.com/office/drawing/2014/main" xmlns="" id="{4FEFC1E8-E09C-48A3-9D61-D187E1075B12}"/>
+                <a16:creationId xmlns:a16="http://schemas.microsoft.com/office/drawing/2014/main" id="{4FEFC1E8-E09C-48A3-9D61-D187E1075B12}"/>
               </a:ext>
             </a:extLst>
           </p:cNvPr>
@@ -709,7 +708,7 @@
           <a:p>
             <a:fld id="{CD63B9D5-DAC7-4B08-8CEE-404A79EB8B50}" type="datetimeFigureOut">
               <a:rPr lang="en-GB" smtClean="0"/>
-              <a:t>08/04/2020</a:t>
+              <a:t>20/09/2024</a:t>
             </a:fld>
             <a:endParaRPr lang="en-GB"/>
           </a:p>
@@ -720,7 +719,7 @@
           <p:cNvPr id="5" name="Footer Placeholder 4">
             <a:extLst>
               <a:ext uri="{FF2B5EF4-FFF2-40B4-BE49-F238E27FC236}">
-                <a16:creationId xmlns:a16="http://schemas.microsoft.com/office/drawing/2014/main" xmlns="" id="{1F4C4C04-B341-40DF-AE4C-91118238B220}"/>
+                <a16:creationId xmlns:a16="http://schemas.microsoft.com/office/drawing/2014/main" id="{1F4C4C04-B341-40DF-AE4C-91118238B220}"/>
               </a:ext>
             </a:extLst>
           </p:cNvPr>
@@ -745,7 +744,7 @@
           <p:cNvPr id="6" name="Slide Number Placeholder 5">
             <a:extLst>
               <a:ext uri="{FF2B5EF4-FFF2-40B4-BE49-F238E27FC236}">
-                <a16:creationId xmlns:a16="http://schemas.microsoft.com/office/drawing/2014/main" xmlns="" id="{5D5DEEB4-09EE-4C2E-8662-9C092E6C6068}"/>
+                <a16:creationId xmlns:a16="http://schemas.microsoft.com/office/drawing/2014/main" id="{5D5DEEB4-09EE-4C2E-8662-9C092E6C6068}"/>
               </a:ext>
             </a:extLst>
           </p:cNvPr>
@@ -804,7 +803,7 @@
           <p:cNvPr id="2" name="Title 1">
             <a:extLst>
               <a:ext uri="{FF2B5EF4-FFF2-40B4-BE49-F238E27FC236}">
-                <a16:creationId xmlns:a16="http://schemas.microsoft.com/office/drawing/2014/main" xmlns="" id="{3EAC4865-75A1-4DAD-BBC6-C5178758A32D}"/>
+                <a16:creationId xmlns:a16="http://schemas.microsoft.com/office/drawing/2014/main" id="{3EAC4865-75A1-4DAD-BBC6-C5178758A32D}"/>
               </a:ext>
             </a:extLst>
           </p:cNvPr>
@@ -833,7 +832,7 @@
           <p:cNvPr id="3" name="Vertical Text Placeholder 2">
             <a:extLst>
               <a:ext uri="{FF2B5EF4-FFF2-40B4-BE49-F238E27FC236}">
-                <a16:creationId xmlns:a16="http://schemas.microsoft.com/office/drawing/2014/main" xmlns="" id="{AC4CD941-D223-4224-9DCB-6F1BB2F51D9A}"/>
+                <a16:creationId xmlns:a16="http://schemas.microsoft.com/office/drawing/2014/main" id="{AC4CD941-D223-4224-9DCB-6F1BB2F51D9A}"/>
               </a:ext>
             </a:extLst>
           </p:cNvPr>
@@ -891,7 +890,7 @@
           <p:cNvPr id="4" name="Date Placeholder 3">
             <a:extLst>
               <a:ext uri="{FF2B5EF4-FFF2-40B4-BE49-F238E27FC236}">
-                <a16:creationId xmlns:a16="http://schemas.microsoft.com/office/drawing/2014/main" xmlns="" id="{CE0D82D8-31BE-476D-9492-36F4123C64A8}"/>
+                <a16:creationId xmlns:a16="http://schemas.microsoft.com/office/drawing/2014/main" id="{CE0D82D8-31BE-476D-9492-36F4123C64A8}"/>
               </a:ext>
             </a:extLst>
           </p:cNvPr>
@@ -909,7 +908,7 @@
           <a:p>
             <a:fld id="{CD63B9D5-DAC7-4B08-8CEE-404A79EB8B50}" type="datetimeFigureOut">
               <a:rPr lang="en-GB" smtClean="0"/>
-              <a:t>08/04/2020</a:t>
+              <a:t>20/09/2024</a:t>
             </a:fld>
             <a:endParaRPr lang="en-GB"/>
           </a:p>
@@ -920,7 +919,7 @@
           <p:cNvPr id="5" name="Footer Placeholder 4">
             <a:extLst>
               <a:ext uri="{FF2B5EF4-FFF2-40B4-BE49-F238E27FC236}">
-                <a16:creationId xmlns:a16="http://schemas.microsoft.com/office/drawing/2014/main" xmlns="" id="{85CCEE5C-93CB-4005-8B5B-96173BA1CE1F}"/>
+                <a16:creationId xmlns:a16="http://schemas.microsoft.com/office/drawing/2014/main" id="{85CCEE5C-93CB-4005-8B5B-96173BA1CE1F}"/>
               </a:ext>
             </a:extLst>
           </p:cNvPr>
@@ -945,7 +944,7 @@
           <p:cNvPr id="6" name="Slide Number Placeholder 5">
             <a:extLst>
               <a:ext uri="{FF2B5EF4-FFF2-40B4-BE49-F238E27FC236}">
-                <a16:creationId xmlns:a16="http://schemas.microsoft.com/office/drawing/2014/main" xmlns="" id="{77D533C4-744B-4ED9-A9A3-BE3780833F70}"/>
+                <a16:creationId xmlns:a16="http://schemas.microsoft.com/office/drawing/2014/main" id="{77D533C4-744B-4ED9-A9A3-BE3780833F70}"/>
               </a:ext>
             </a:extLst>
           </p:cNvPr>
@@ -1004,7 +1003,7 @@
           <p:cNvPr id="2" name="Vertical Title 1">
             <a:extLst>
               <a:ext uri="{FF2B5EF4-FFF2-40B4-BE49-F238E27FC236}">
-                <a16:creationId xmlns:a16="http://schemas.microsoft.com/office/drawing/2014/main" xmlns="" id="{688681E7-F837-4F64-9BB8-42F1D5E46D8A}"/>
+                <a16:creationId xmlns:a16="http://schemas.microsoft.com/office/drawing/2014/main" id="{688681E7-F837-4F64-9BB8-42F1D5E46D8A}"/>
               </a:ext>
             </a:extLst>
           </p:cNvPr>
@@ -1038,7 +1037,7 @@
           <p:cNvPr id="3" name="Vertical Text Placeholder 2">
             <a:extLst>
               <a:ext uri="{FF2B5EF4-FFF2-40B4-BE49-F238E27FC236}">
-                <a16:creationId xmlns:a16="http://schemas.microsoft.com/office/drawing/2014/main" xmlns="" id="{57EE781F-E227-4CC0-BCB8-6A13ED3D64A8}"/>
+                <a16:creationId xmlns:a16="http://schemas.microsoft.com/office/drawing/2014/main" id="{57EE781F-E227-4CC0-BCB8-6A13ED3D64A8}"/>
               </a:ext>
             </a:extLst>
           </p:cNvPr>
@@ -1101,7 +1100,7 @@
           <p:cNvPr id="4" name="Date Placeholder 3">
             <a:extLst>
               <a:ext uri="{FF2B5EF4-FFF2-40B4-BE49-F238E27FC236}">
-                <a16:creationId xmlns:a16="http://schemas.microsoft.com/office/drawing/2014/main" xmlns="" id="{5A00E8FF-4824-4DA7-A099-5673F81F4E5E}"/>
+                <a16:creationId xmlns:a16="http://schemas.microsoft.com/office/drawing/2014/main" id="{5A00E8FF-4824-4DA7-A099-5673F81F4E5E}"/>
               </a:ext>
             </a:extLst>
           </p:cNvPr>
@@ -1119,7 +1118,7 @@
           <a:p>
             <a:fld id="{CD63B9D5-DAC7-4B08-8CEE-404A79EB8B50}" type="datetimeFigureOut">
               <a:rPr lang="en-GB" smtClean="0"/>
-              <a:t>08/04/2020</a:t>
+              <a:t>20/09/2024</a:t>
             </a:fld>
             <a:endParaRPr lang="en-GB"/>
           </a:p>
@@ -1130,7 +1129,7 @@
           <p:cNvPr id="5" name="Footer Placeholder 4">
             <a:extLst>
               <a:ext uri="{FF2B5EF4-FFF2-40B4-BE49-F238E27FC236}">
-                <a16:creationId xmlns:a16="http://schemas.microsoft.com/office/drawing/2014/main" xmlns="" id="{4969B440-1EFC-412A-BFEA-7F256D0D3CAB}"/>
+                <a16:creationId xmlns:a16="http://schemas.microsoft.com/office/drawing/2014/main" id="{4969B440-1EFC-412A-BFEA-7F256D0D3CAB}"/>
               </a:ext>
             </a:extLst>
           </p:cNvPr>
@@ -1155,7 +1154,7 @@
           <p:cNvPr id="6" name="Slide Number Placeholder 5">
             <a:extLst>
               <a:ext uri="{FF2B5EF4-FFF2-40B4-BE49-F238E27FC236}">
-                <a16:creationId xmlns:a16="http://schemas.microsoft.com/office/drawing/2014/main" xmlns="" id="{DDA80736-99D3-48F4-9625-32CBA9B7D074}"/>
+                <a16:creationId xmlns:a16="http://schemas.microsoft.com/office/drawing/2014/main" id="{DDA80736-99D3-48F4-9625-32CBA9B7D074}"/>
               </a:ext>
             </a:extLst>
           </p:cNvPr>
@@ -1214,7 +1213,7 @@
           <p:cNvPr id="2" name="Title 1">
             <a:extLst>
               <a:ext uri="{FF2B5EF4-FFF2-40B4-BE49-F238E27FC236}">
-                <a16:creationId xmlns:a16="http://schemas.microsoft.com/office/drawing/2014/main" xmlns="" id="{E0DEB4AB-2ACD-4D36-9E26-4C108DF6D6BD}"/>
+                <a16:creationId xmlns:a16="http://schemas.microsoft.com/office/drawing/2014/main" id="{E0DEB4AB-2ACD-4D36-9E26-4C108DF6D6BD}"/>
               </a:ext>
             </a:extLst>
           </p:cNvPr>
@@ -1243,7 +1242,7 @@
           <p:cNvPr id="3" name="Content Placeholder 2">
             <a:extLst>
               <a:ext uri="{FF2B5EF4-FFF2-40B4-BE49-F238E27FC236}">
-                <a16:creationId xmlns:a16="http://schemas.microsoft.com/office/drawing/2014/main" xmlns="" id="{5DF2F204-B616-4B3F-88DE-B9607FF9DAF5}"/>
+                <a16:creationId xmlns:a16="http://schemas.microsoft.com/office/drawing/2014/main" id="{5DF2F204-B616-4B3F-88DE-B9607FF9DAF5}"/>
               </a:ext>
             </a:extLst>
           </p:cNvPr>
@@ -1301,7 +1300,7 @@
           <p:cNvPr id="4" name="Date Placeholder 3">
             <a:extLst>
               <a:ext uri="{FF2B5EF4-FFF2-40B4-BE49-F238E27FC236}">
-                <a16:creationId xmlns:a16="http://schemas.microsoft.com/office/drawing/2014/main" xmlns="" id="{3099031F-406C-461B-AC2A-D6B0BEE1F59E}"/>
+                <a16:creationId xmlns:a16="http://schemas.microsoft.com/office/drawing/2014/main" id="{3099031F-406C-461B-AC2A-D6B0BEE1F59E}"/>
               </a:ext>
             </a:extLst>
           </p:cNvPr>
@@ -1319,7 +1318,7 @@
           <a:p>
             <a:fld id="{CD63B9D5-DAC7-4B08-8CEE-404A79EB8B50}" type="datetimeFigureOut">
               <a:rPr lang="en-GB" smtClean="0"/>
-              <a:t>08/04/2020</a:t>
+              <a:t>20/09/2024</a:t>
             </a:fld>
             <a:endParaRPr lang="en-GB"/>
           </a:p>
@@ -1330,7 +1329,7 @@
           <p:cNvPr id="5" name="Footer Placeholder 4">
             <a:extLst>
               <a:ext uri="{FF2B5EF4-FFF2-40B4-BE49-F238E27FC236}">
-                <a16:creationId xmlns:a16="http://schemas.microsoft.com/office/drawing/2014/main" xmlns="" id="{D9A7AA01-5469-4B86-BD49-D9EABDB8823F}"/>
+                <a16:creationId xmlns:a16="http://schemas.microsoft.com/office/drawing/2014/main" id="{D9A7AA01-5469-4B86-BD49-D9EABDB8823F}"/>
               </a:ext>
             </a:extLst>
           </p:cNvPr>
@@ -1355,7 +1354,7 @@
           <p:cNvPr id="6" name="Slide Number Placeholder 5">
             <a:extLst>
               <a:ext uri="{FF2B5EF4-FFF2-40B4-BE49-F238E27FC236}">
-                <a16:creationId xmlns:a16="http://schemas.microsoft.com/office/drawing/2014/main" xmlns="" id="{668BD442-3189-4AE3-A972-49F6085D44CB}"/>
+                <a16:creationId xmlns:a16="http://schemas.microsoft.com/office/drawing/2014/main" id="{668BD442-3189-4AE3-A972-49F6085D44CB}"/>
               </a:ext>
             </a:extLst>
           </p:cNvPr>
@@ -1414,7 +1413,7 @@
           <p:cNvPr id="2" name="Title 1">
             <a:extLst>
               <a:ext uri="{FF2B5EF4-FFF2-40B4-BE49-F238E27FC236}">
-                <a16:creationId xmlns:a16="http://schemas.microsoft.com/office/drawing/2014/main" xmlns="" id="{9A02A5BD-1949-4548-93F1-CDE529AD1EF2}"/>
+                <a16:creationId xmlns:a16="http://schemas.microsoft.com/office/drawing/2014/main" id="{9A02A5BD-1949-4548-93F1-CDE529AD1EF2}"/>
               </a:ext>
             </a:extLst>
           </p:cNvPr>
@@ -1452,7 +1451,7 @@
           <p:cNvPr id="3" name="Text Placeholder 2">
             <a:extLst>
               <a:ext uri="{FF2B5EF4-FFF2-40B4-BE49-F238E27FC236}">
-                <a16:creationId xmlns:a16="http://schemas.microsoft.com/office/drawing/2014/main" xmlns="" id="{A888555D-FFFA-453D-ACAB-6206186F612C}"/>
+                <a16:creationId xmlns:a16="http://schemas.microsoft.com/office/drawing/2014/main" id="{A888555D-FFFA-453D-ACAB-6206186F612C}"/>
               </a:ext>
             </a:extLst>
           </p:cNvPr>
@@ -1577,7 +1576,7 @@
           <p:cNvPr id="4" name="Date Placeholder 3">
             <a:extLst>
               <a:ext uri="{FF2B5EF4-FFF2-40B4-BE49-F238E27FC236}">
-                <a16:creationId xmlns:a16="http://schemas.microsoft.com/office/drawing/2014/main" xmlns="" id="{6EAD1FF9-B926-433C-B06C-FB64E5C8160D}"/>
+                <a16:creationId xmlns:a16="http://schemas.microsoft.com/office/drawing/2014/main" id="{6EAD1FF9-B926-433C-B06C-FB64E5C8160D}"/>
               </a:ext>
             </a:extLst>
           </p:cNvPr>
@@ -1595,7 +1594,7 @@
           <a:p>
             <a:fld id="{CD63B9D5-DAC7-4B08-8CEE-404A79EB8B50}" type="datetimeFigureOut">
               <a:rPr lang="en-GB" smtClean="0"/>
-              <a:t>08/04/2020</a:t>
+              <a:t>20/09/2024</a:t>
             </a:fld>
             <a:endParaRPr lang="en-GB"/>
           </a:p>
@@ -1606,7 +1605,7 @@
           <p:cNvPr id="5" name="Footer Placeholder 4">
             <a:extLst>
               <a:ext uri="{FF2B5EF4-FFF2-40B4-BE49-F238E27FC236}">
-                <a16:creationId xmlns:a16="http://schemas.microsoft.com/office/drawing/2014/main" xmlns="" id="{1D40BA7E-57FB-4588-9A34-B9422F264B0B}"/>
+                <a16:creationId xmlns:a16="http://schemas.microsoft.com/office/drawing/2014/main" id="{1D40BA7E-57FB-4588-9A34-B9422F264B0B}"/>
               </a:ext>
             </a:extLst>
           </p:cNvPr>
@@ -1631,7 +1630,7 @@
           <p:cNvPr id="6" name="Slide Number Placeholder 5">
             <a:extLst>
               <a:ext uri="{FF2B5EF4-FFF2-40B4-BE49-F238E27FC236}">
-                <a16:creationId xmlns:a16="http://schemas.microsoft.com/office/drawing/2014/main" xmlns="" id="{3A1FFDA7-5351-4270-BE41-9CD2F959E409}"/>
+                <a16:creationId xmlns:a16="http://schemas.microsoft.com/office/drawing/2014/main" id="{3A1FFDA7-5351-4270-BE41-9CD2F959E409}"/>
               </a:ext>
             </a:extLst>
           </p:cNvPr>
@@ -1690,7 +1689,7 @@
           <p:cNvPr id="2" name="Title 1">
             <a:extLst>
               <a:ext uri="{FF2B5EF4-FFF2-40B4-BE49-F238E27FC236}">
-                <a16:creationId xmlns:a16="http://schemas.microsoft.com/office/drawing/2014/main" xmlns="" id="{D10AA3F8-7AD2-4A6C-AE51-D79A229E9B86}"/>
+                <a16:creationId xmlns:a16="http://schemas.microsoft.com/office/drawing/2014/main" id="{D10AA3F8-7AD2-4A6C-AE51-D79A229E9B86}"/>
               </a:ext>
             </a:extLst>
           </p:cNvPr>
@@ -1719,7 +1718,7 @@
           <p:cNvPr id="3" name="Content Placeholder 2">
             <a:extLst>
               <a:ext uri="{FF2B5EF4-FFF2-40B4-BE49-F238E27FC236}">
-                <a16:creationId xmlns:a16="http://schemas.microsoft.com/office/drawing/2014/main" xmlns="" id="{49E792F2-2085-4737-8A00-EB52F14FA311}"/>
+                <a16:creationId xmlns:a16="http://schemas.microsoft.com/office/drawing/2014/main" id="{49E792F2-2085-4737-8A00-EB52F14FA311}"/>
               </a:ext>
             </a:extLst>
           </p:cNvPr>
@@ -1782,7 +1781,7 @@
           <p:cNvPr id="4" name="Content Placeholder 3">
             <a:extLst>
               <a:ext uri="{FF2B5EF4-FFF2-40B4-BE49-F238E27FC236}">
-                <a16:creationId xmlns:a16="http://schemas.microsoft.com/office/drawing/2014/main" xmlns="" id="{FF48E3CE-BA15-45FF-BEF4-FB52DBF1006E}"/>
+                <a16:creationId xmlns:a16="http://schemas.microsoft.com/office/drawing/2014/main" id="{FF48E3CE-BA15-45FF-BEF4-FB52DBF1006E}"/>
               </a:ext>
             </a:extLst>
           </p:cNvPr>
@@ -1845,7 +1844,7 @@
           <p:cNvPr id="5" name="Date Placeholder 4">
             <a:extLst>
               <a:ext uri="{FF2B5EF4-FFF2-40B4-BE49-F238E27FC236}">
-                <a16:creationId xmlns:a16="http://schemas.microsoft.com/office/drawing/2014/main" xmlns="" id="{D7FF647A-3903-44BA-8128-944BAAF7455F}"/>
+                <a16:creationId xmlns:a16="http://schemas.microsoft.com/office/drawing/2014/main" id="{D7FF647A-3903-44BA-8128-944BAAF7455F}"/>
               </a:ext>
             </a:extLst>
           </p:cNvPr>
@@ -1863,7 +1862,7 @@
           <a:p>
             <a:fld id="{CD63B9D5-DAC7-4B08-8CEE-404A79EB8B50}" type="datetimeFigureOut">
               <a:rPr lang="en-GB" smtClean="0"/>
-              <a:t>08/04/2020</a:t>
+              <a:t>20/09/2024</a:t>
             </a:fld>
             <a:endParaRPr lang="en-GB"/>
           </a:p>
@@ -1874,7 +1873,7 @@
           <p:cNvPr id="6" name="Footer Placeholder 5">
             <a:extLst>
               <a:ext uri="{FF2B5EF4-FFF2-40B4-BE49-F238E27FC236}">
-                <a16:creationId xmlns:a16="http://schemas.microsoft.com/office/drawing/2014/main" xmlns="" id="{37E1F688-F587-4E7A-9629-3C5023528E89}"/>
+                <a16:creationId xmlns:a16="http://schemas.microsoft.com/office/drawing/2014/main" id="{37E1F688-F587-4E7A-9629-3C5023528E89}"/>
               </a:ext>
             </a:extLst>
           </p:cNvPr>
@@ -1899,7 +1898,7 @@
           <p:cNvPr id="7" name="Slide Number Placeholder 6">
             <a:extLst>
               <a:ext uri="{FF2B5EF4-FFF2-40B4-BE49-F238E27FC236}">
-                <a16:creationId xmlns:a16="http://schemas.microsoft.com/office/drawing/2014/main" xmlns="" id="{89513A7E-58AF-46B2-A4DA-E9FCB3FC295F}"/>
+                <a16:creationId xmlns:a16="http://schemas.microsoft.com/office/drawing/2014/main" id="{89513A7E-58AF-46B2-A4DA-E9FCB3FC295F}"/>
               </a:ext>
             </a:extLst>
           </p:cNvPr>
@@ -1958,7 +1957,7 @@
           <p:cNvPr id="2" name="Title 1">
             <a:extLst>
               <a:ext uri="{FF2B5EF4-FFF2-40B4-BE49-F238E27FC236}">
-                <a16:creationId xmlns:a16="http://schemas.microsoft.com/office/drawing/2014/main" xmlns="" id="{F885DEE0-906F-43A1-B94D-83EE2069D3A1}"/>
+                <a16:creationId xmlns:a16="http://schemas.microsoft.com/office/drawing/2014/main" id="{F885DEE0-906F-43A1-B94D-83EE2069D3A1}"/>
               </a:ext>
             </a:extLst>
           </p:cNvPr>
@@ -1992,7 +1991,7 @@
           <p:cNvPr id="3" name="Text Placeholder 2">
             <a:extLst>
               <a:ext uri="{FF2B5EF4-FFF2-40B4-BE49-F238E27FC236}">
-                <a16:creationId xmlns:a16="http://schemas.microsoft.com/office/drawing/2014/main" xmlns="" id="{0EDFBB4F-F248-4DFC-A6CE-7B9A43C69F07}"/>
+                <a16:creationId xmlns:a16="http://schemas.microsoft.com/office/drawing/2014/main" id="{0EDFBB4F-F248-4DFC-A6CE-7B9A43C69F07}"/>
               </a:ext>
             </a:extLst>
           </p:cNvPr>
@@ -2063,7 +2062,7 @@
           <p:cNvPr id="4" name="Content Placeholder 3">
             <a:extLst>
               <a:ext uri="{FF2B5EF4-FFF2-40B4-BE49-F238E27FC236}">
-                <a16:creationId xmlns:a16="http://schemas.microsoft.com/office/drawing/2014/main" xmlns="" id="{913AAB10-03B8-495A-93E6-6C140E343699}"/>
+                <a16:creationId xmlns:a16="http://schemas.microsoft.com/office/drawing/2014/main" id="{913AAB10-03B8-495A-93E6-6C140E343699}"/>
               </a:ext>
             </a:extLst>
           </p:cNvPr>
@@ -2126,7 +2125,7 @@
           <p:cNvPr id="5" name="Text Placeholder 4">
             <a:extLst>
               <a:ext uri="{FF2B5EF4-FFF2-40B4-BE49-F238E27FC236}">
-                <a16:creationId xmlns:a16="http://schemas.microsoft.com/office/drawing/2014/main" xmlns="" id="{D796D015-D28A-4436-806E-BE0885729726}"/>
+                <a16:creationId xmlns:a16="http://schemas.microsoft.com/office/drawing/2014/main" id="{D796D015-D28A-4436-806E-BE0885729726}"/>
               </a:ext>
             </a:extLst>
           </p:cNvPr>
@@ -2197,7 +2196,7 @@
           <p:cNvPr id="6" name="Content Placeholder 5">
             <a:extLst>
               <a:ext uri="{FF2B5EF4-FFF2-40B4-BE49-F238E27FC236}">
-                <a16:creationId xmlns:a16="http://schemas.microsoft.com/office/drawing/2014/main" xmlns="" id="{6941E6C3-7B55-4DC6-B3BE-5267F66AAFCD}"/>
+                <a16:creationId xmlns:a16="http://schemas.microsoft.com/office/drawing/2014/main" id="{6941E6C3-7B55-4DC6-B3BE-5267F66AAFCD}"/>
               </a:ext>
             </a:extLst>
           </p:cNvPr>
@@ -2260,7 +2259,7 @@
           <p:cNvPr id="7" name="Date Placeholder 6">
             <a:extLst>
               <a:ext uri="{FF2B5EF4-FFF2-40B4-BE49-F238E27FC236}">
-                <a16:creationId xmlns:a16="http://schemas.microsoft.com/office/drawing/2014/main" xmlns="" id="{B24863BF-F146-4BF9-82BE-D5C98465F44A}"/>
+                <a16:creationId xmlns:a16="http://schemas.microsoft.com/office/drawing/2014/main" id="{B24863BF-F146-4BF9-82BE-D5C98465F44A}"/>
               </a:ext>
             </a:extLst>
           </p:cNvPr>
@@ -2278,7 +2277,7 @@
           <a:p>
             <a:fld id="{CD63B9D5-DAC7-4B08-8CEE-404A79EB8B50}" type="datetimeFigureOut">
               <a:rPr lang="en-GB" smtClean="0"/>
-              <a:t>08/04/2020</a:t>
+              <a:t>20/09/2024</a:t>
             </a:fld>
             <a:endParaRPr lang="en-GB"/>
           </a:p>
@@ -2289,7 +2288,7 @@
           <p:cNvPr id="8" name="Footer Placeholder 7">
             <a:extLst>
               <a:ext uri="{FF2B5EF4-FFF2-40B4-BE49-F238E27FC236}">
-                <a16:creationId xmlns:a16="http://schemas.microsoft.com/office/drawing/2014/main" xmlns="" id="{DC2043F8-A70E-45E2-B246-AF3F81BA80EE}"/>
+                <a16:creationId xmlns:a16="http://schemas.microsoft.com/office/drawing/2014/main" id="{DC2043F8-A70E-45E2-B246-AF3F81BA80EE}"/>
               </a:ext>
             </a:extLst>
           </p:cNvPr>
@@ -2314,7 +2313,7 @@
           <p:cNvPr id="9" name="Slide Number Placeholder 8">
             <a:extLst>
               <a:ext uri="{FF2B5EF4-FFF2-40B4-BE49-F238E27FC236}">
-                <a16:creationId xmlns:a16="http://schemas.microsoft.com/office/drawing/2014/main" xmlns="" id="{808CE3B0-7C7B-4AEC-ABDD-C5C25CB2D59F}"/>
+                <a16:creationId xmlns:a16="http://schemas.microsoft.com/office/drawing/2014/main" id="{808CE3B0-7C7B-4AEC-ABDD-C5C25CB2D59F}"/>
               </a:ext>
             </a:extLst>
           </p:cNvPr>
@@ -2373,7 +2372,7 @@
           <p:cNvPr id="2" name="Title 1">
             <a:extLst>
               <a:ext uri="{FF2B5EF4-FFF2-40B4-BE49-F238E27FC236}">
-                <a16:creationId xmlns:a16="http://schemas.microsoft.com/office/drawing/2014/main" xmlns="" id="{7CA1A695-9C4D-4596-92E8-E75C6B27B406}"/>
+                <a16:creationId xmlns:a16="http://schemas.microsoft.com/office/drawing/2014/main" id="{7CA1A695-9C4D-4596-92E8-E75C6B27B406}"/>
               </a:ext>
             </a:extLst>
           </p:cNvPr>
@@ -2402,7 +2401,7 @@
           <p:cNvPr id="3" name="Date Placeholder 2">
             <a:extLst>
               <a:ext uri="{FF2B5EF4-FFF2-40B4-BE49-F238E27FC236}">
-                <a16:creationId xmlns:a16="http://schemas.microsoft.com/office/drawing/2014/main" xmlns="" id="{22CC87F7-07CB-4214-8296-DD5FF904E220}"/>
+                <a16:creationId xmlns:a16="http://schemas.microsoft.com/office/drawing/2014/main" id="{22CC87F7-07CB-4214-8296-DD5FF904E220}"/>
               </a:ext>
             </a:extLst>
           </p:cNvPr>
@@ -2420,7 +2419,7 @@
           <a:p>
             <a:fld id="{CD63B9D5-DAC7-4B08-8CEE-404A79EB8B50}" type="datetimeFigureOut">
               <a:rPr lang="en-GB" smtClean="0"/>
-              <a:t>08/04/2020</a:t>
+              <a:t>20/09/2024</a:t>
             </a:fld>
             <a:endParaRPr lang="en-GB"/>
           </a:p>
@@ -2431,7 +2430,7 @@
           <p:cNvPr id="4" name="Footer Placeholder 3">
             <a:extLst>
               <a:ext uri="{FF2B5EF4-FFF2-40B4-BE49-F238E27FC236}">
-                <a16:creationId xmlns:a16="http://schemas.microsoft.com/office/drawing/2014/main" xmlns="" id="{3C9715A1-6DA6-4A41-84F7-B50E9BA0E3E0}"/>
+                <a16:creationId xmlns:a16="http://schemas.microsoft.com/office/drawing/2014/main" id="{3C9715A1-6DA6-4A41-84F7-B50E9BA0E3E0}"/>
               </a:ext>
             </a:extLst>
           </p:cNvPr>
@@ -2456,7 +2455,7 @@
           <p:cNvPr id="5" name="Slide Number Placeholder 4">
             <a:extLst>
               <a:ext uri="{FF2B5EF4-FFF2-40B4-BE49-F238E27FC236}">
-                <a16:creationId xmlns:a16="http://schemas.microsoft.com/office/drawing/2014/main" xmlns="" id="{C9D5EFE8-7FD1-4DF4-86A8-2A232A281290}"/>
+                <a16:creationId xmlns:a16="http://schemas.microsoft.com/office/drawing/2014/main" id="{C9D5EFE8-7FD1-4DF4-86A8-2A232A281290}"/>
               </a:ext>
             </a:extLst>
           </p:cNvPr>
@@ -2515,7 +2514,7 @@
           <p:cNvPr id="2" name="Date Placeholder 1">
             <a:extLst>
               <a:ext uri="{FF2B5EF4-FFF2-40B4-BE49-F238E27FC236}">
-                <a16:creationId xmlns:a16="http://schemas.microsoft.com/office/drawing/2014/main" xmlns="" id="{48B95A67-71FC-4D0D-96F5-031CEF8EF530}"/>
+                <a16:creationId xmlns:a16="http://schemas.microsoft.com/office/drawing/2014/main" id="{48B95A67-71FC-4D0D-96F5-031CEF8EF530}"/>
               </a:ext>
             </a:extLst>
           </p:cNvPr>
@@ -2533,7 +2532,7 @@
           <a:p>
             <a:fld id="{CD63B9D5-DAC7-4B08-8CEE-404A79EB8B50}" type="datetimeFigureOut">
               <a:rPr lang="en-GB" smtClean="0"/>
-              <a:t>08/04/2020</a:t>
+              <a:t>20/09/2024</a:t>
             </a:fld>
             <a:endParaRPr lang="en-GB"/>
           </a:p>
@@ -2544,7 +2543,7 @@
           <p:cNvPr id="3" name="Footer Placeholder 2">
             <a:extLst>
               <a:ext uri="{FF2B5EF4-FFF2-40B4-BE49-F238E27FC236}">
-                <a16:creationId xmlns:a16="http://schemas.microsoft.com/office/drawing/2014/main" xmlns="" id="{083B286F-4DFF-4AA2-A347-FD17748FFDFF}"/>
+                <a16:creationId xmlns:a16="http://schemas.microsoft.com/office/drawing/2014/main" id="{083B286F-4DFF-4AA2-A347-FD17748FFDFF}"/>
               </a:ext>
             </a:extLst>
           </p:cNvPr>
@@ -2569,7 +2568,7 @@
           <p:cNvPr id="4" name="Slide Number Placeholder 3">
             <a:extLst>
               <a:ext uri="{FF2B5EF4-FFF2-40B4-BE49-F238E27FC236}">
-                <a16:creationId xmlns:a16="http://schemas.microsoft.com/office/drawing/2014/main" xmlns="" id="{2731AD27-8C09-4D3D-BB5B-6B9760DD39F3}"/>
+                <a16:creationId xmlns:a16="http://schemas.microsoft.com/office/drawing/2014/main" id="{2731AD27-8C09-4D3D-BB5B-6B9760DD39F3}"/>
               </a:ext>
             </a:extLst>
           </p:cNvPr>
@@ -2628,7 +2627,7 @@
           <p:cNvPr id="2" name="Title 1">
             <a:extLst>
               <a:ext uri="{FF2B5EF4-FFF2-40B4-BE49-F238E27FC236}">
-                <a16:creationId xmlns:a16="http://schemas.microsoft.com/office/drawing/2014/main" xmlns="" id="{7B7E36D2-947E-47E4-A62D-FAD241D98AD8}"/>
+                <a16:creationId xmlns:a16="http://schemas.microsoft.com/office/drawing/2014/main" id="{7B7E36D2-947E-47E4-A62D-FAD241D98AD8}"/>
               </a:ext>
             </a:extLst>
           </p:cNvPr>
@@ -2666,7 +2665,7 @@
           <p:cNvPr id="3" name="Content Placeholder 2">
             <a:extLst>
               <a:ext uri="{FF2B5EF4-FFF2-40B4-BE49-F238E27FC236}">
-                <a16:creationId xmlns:a16="http://schemas.microsoft.com/office/drawing/2014/main" xmlns="" id="{914C2D84-9D6A-4AF9-BEA3-36066D34BB3B}"/>
+                <a16:creationId xmlns:a16="http://schemas.microsoft.com/office/drawing/2014/main" id="{914C2D84-9D6A-4AF9-BEA3-36066D34BB3B}"/>
               </a:ext>
             </a:extLst>
           </p:cNvPr>
@@ -2757,7 +2756,7 @@
           <p:cNvPr id="4" name="Text Placeholder 3">
             <a:extLst>
               <a:ext uri="{FF2B5EF4-FFF2-40B4-BE49-F238E27FC236}">
-                <a16:creationId xmlns:a16="http://schemas.microsoft.com/office/drawing/2014/main" xmlns="" id="{6243A93F-9C78-4180-BC63-C9AA8406A91D}"/>
+                <a16:creationId xmlns:a16="http://schemas.microsoft.com/office/drawing/2014/main" id="{6243A93F-9C78-4180-BC63-C9AA8406A91D}"/>
               </a:ext>
             </a:extLst>
           </p:cNvPr>
@@ -2828,7 +2827,7 @@
           <p:cNvPr id="5" name="Date Placeholder 4">
             <a:extLst>
               <a:ext uri="{FF2B5EF4-FFF2-40B4-BE49-F238E27FC236}">
-                <a16:creationId xmlns:a16="http://schemas.microsoft.com/office/drawing/2014/main" xmlns="" id="{150242FA-EA05-4ECF-A431-C99805AE8DF2}"/>
+                <a16:creationId xmlns:a16="http://schemas.microsoft.com/office/drawing/2014/main" id="{150242FA-EA05-4ECF-A431-C99805AE8DF2}"/>
               </a:ext>
             </a:extLst>
           </p:cNvPr>
@@ -2846,7 +2845,7 @@
           <a:p>
             <a:fld id="{CD63B9D5-DAC7-4B08-8CEE-404A79EB8B50}" type="datetimeFigureOut">
               <a:rPr lang="en-GB" smtClean="0"/>
-              <a:t>08/04/2020</a:t>
+              <a:t>20/09/2024</a:t>
             </a:fld>
             <a:endParaRPr lang="en-GB"/>
           </a:p>
@@ -2857,7 +2856,7 @@
           <p:cNvPr id="6" name="Footer Placeholder 5">
             <a:extLst>
               <a:ext uri="{FF2B5EF4-FFF2-40B4-BE49-F238E27FC236}">
-                <a16:creationId xmlns:a16="http://schemas.microsoft.com/office/drawing/2014/main" xmlns="" id="{0038E84D-C6EA-4230-B34D-985C0C575DA6}"/>
+                <a16:creationId xmlns:a16="http://schemas.microsoft.com/office/drawing/2014/main" id="{0038E84D-C6EA-4230-B34D-985C0C575DA6}"/>
               </a:ext>
             </a:extLst>
           </p:cNvPr>
@@ -2882,7 +2881,7 @@
           <p:cNvPr id="7" name="Slide Number Placeholder 6">
             <a:extLst>
               <a:ext uri="{FF2B5EF4-FFF2-40B4-BE49-F238E27FC236}">
-                <a16:creationId xmlns:a16="http://schemas.microsoft.com/office/drawing/2014/main" xmlns="" id="{4B22D5FF-B1DD-4B28-866C-56DD45FBE717}"/>
+                <a16:creationId xmlns:a16="http://schemas.microsoft.com/office/drawing/2014/main" id="{4B22D5FF-B1DD-4B28-866C-56DD45FBE717}"/>
               </a:ext>
             </a:extLst>
           </p:cNvPr>
@@ -2941,7 +2940,7 @@
           <p:cNvPr id="2" name="Title 1">
             <a:extLst>
               <a:ext uri="{FF2B5EF4-FFF2-40B4-BE49-F238E27FC236}">
-                <a16:creationId xmlns:a16="http://schemas.microsoft.com/office/drawing/2014/main" xmlns="" id="{634BEE94-FEDF-40D9-9699-99410C9465D8}"/>
+                <a16:creationId xmlns:a16="http://schemas.microsoft.com/office/drawing/2014/main" id="{634BEE94-FEDF-40D9-9699-99410C9465D8}"/>
               </a:ext>
             </a:extLst>
           </p:cNvPr>
@@ -2979,7 +2978,7 @@
           <p:cNvPr id="3" name="Picture Placeholder 2">
             <a:extLst>
               <a:ext uri="{FF2B5EF4-FFF2-40B4-BE49-F238E27FC236}">
-                <a16:creationId xmlns:a16="http://schemas.microsoft.com/office/drawing/2014/main" xmlns="" id="{76248A86-4CC2-453D-B05F-1C2B24E9A6D8}"/>
+                <a16:creationId xmlns:a16="http://schemas.microsoft.com/office/drawing/2014/main" id="{76248A86-4CC2-453D-B05F-1C2B24E9A6D8}"/>
               </a:ext>
             </a:extLst>
           </p:cNvPr>
@@ -3046,7 +3045,7 @@
           <p:cNvPr id="4" name="Text Placeholder 3">
             <a:extLst>
               <a:ext uri="{FF2B5EF4-FFF2-40B4-BE49-F238E27FC236}">
-                <a16:creationId xmlns:a16="http://schemas.microsoft.com/office/drawing/2014/main" xmlns="" id="{0A00B450-7D9C-4243-81C2-1188B1712CED}"/>
+                <a16:creationId xmlns:a16="http://schemas.microsoft.com/office/drawing/2014/main" id="{0A00B450-7D9C-4243-81C2-1188B1712CED}"/>
               </a:ext>
             </a:extLst>
           </p:cNvPr>
@@ -3117,7 +3116,7 @@
           <p:cNvPr id="5" name="Date Placeholder 4">
             <a:extLst>
               <a:ext uri="{FF2B5EF4-FFF2-40B4-BE49-F238E27FC236}">
-                <a16:creationId xmlns:a16="http://schemas.microsoft.com/office/drawing/2014/main" xmlns="" id="{37296551-D478-465D-831C-96C8AF0CB33D}"/>
+                <a16:creationId xmlns:a16="http://schemas.microsoft.com/office/drawing/2014/main" id="{37296551-D478-465D-831C-96C8AF0CB33D}"/>
               </a:ext>
             </a:extLst>
           </p:cNvPr>
@@ -3135,7 +3134,7 @@
           <a:p>
             <a:fld id="{CD63B9D5-DAC7-4B08-8CEE-404A79EB8B50}" type="datetimeFigureOut">
               <a:rPr lang="en-GB" smtClean="0"/>
-              <a:t>08/04/2020</a:t>
+              <a:t>20/09/2024</a:t>
             </a:fld>
             <a:endParaRPr lang="en-GB"/>
           </a:p>
@@ -3146,7 +3145,7 @@
           <p:cNvPr id="6" name="Footer Placeholder 5">
             <a:extLst>
               <a:ext uri="{FF2B5EF4-FFF2-40B4-BE49-F238E27FC236}">
-                <a16:creationId xmlns:a16="http://schemas.microsoft.com/office/drawing/2014/main" xmlns="" id="{ABA4E524-0252-4AB0-90B5-B7CC3B2478C6}"/>
+                <a16:creationId xmlns:a16="http://schemas.microsoft.com/office/drawing/2014/main" id="{ABA4E524-0252-4AB0-90B5-B7CC3B2478C6}"/>
               </a:ext>
             </a:extLst>
           </p:cNvPr>
@@ -3171,7 +3170,7 @@
           <p:cNvPr id="7" name="Slide Number Placeholder 6">
             <a:extLst>
               <a:ext uri="{FF2B5EF4-FFF2-40B4-BE49-F238E27FC236}">
-                <a16:creationId xmlns:a16="http://schemas.microsoft.com/office/drawing/2014/main" xmlns="" id="{1AFF83BD-F807-4BA1-8BF1-CF413382D286}"/>
+                <a16:creationId xmlns:a16="http://schemas.microsoft.com/office/drawing/2014/main" id="{1AFF83BD-F807-4BA1-8BF1-CF413382D286}"/>
               </a:ext>
             </a:extLst>
           </p:cNvPr>
@@ -3235,7 +3234,7 @@
           <p:cNvPr id="2" name="Title Placeholder 1">
             <a:extLst>
               <a:ext uri="{FF2B5EF4-FFF2-40B4-BE49-F238E27FC236}">
-                <a16:creationId xmlns:a16="http://schemas.microsoft.com/office/drawing/2014/main" xmlns="" id="{B28F1C91-5049-47A4-A4D5-5A7BBE7720F6}"/>
+                <a16:creationId xmlns:a16="http://schemas.microsoft.com/office/drawing/2014/main" id="{B28F1C91-5049-47A4-A4D5-5A7BBE7720F6}"/>
               </a:ext>
             </a:extLst>
           </p:cNvPr>
@@ -3274,7 +3273,7 @@
           <p:cNvPr id="3" name="Text Placeholder 2">
             <a:extLst>
               <a:ext uri="{FF2B5EF4-FFF2-40B4-BE49-F238E27FC236}">
-                <a16:creationId xmlns:a16="http://schemas.microsoft.com/office/drawing/2014/main" xmlns="" id="{80E007B8-BBD7-438D-9DDC-5B6A646CEA5D}"/>
+                <a16:creationId xmlns:a16="http://schemas.microsoft.com/office/drawing/2014/main" id="{80E007B8-BBD7-438D-9DDC-5B6A646CEA5D}"/>
               </a:ext>
             </a:extLst>
           </p:cNvPr>
@@ -3342,7 +3341,7 @@
           <p:cNvPr id="4" name="Date Placeholder 3">
             <a:extLst>
               <a:ext uri="{FF2B5EF4-FFF2-40B4-BE49-F238E27FC236}">
-                <a16:creationId xmlns:a16="http://schemas.microsoft.com/office/drawing/2014/main" xmlns="" id="{285C4E8A-F193-4D8B-B1C5-DAA70667FC3A}"/>
+                <a16:creationId xmlns:a16="http://schemas.microsoft.com/office/drawing/2014/main" id="{285C4E8A-F193-4D8B-B1C5-DAA70667FC3A}"/>
               </a:ext>
             </a:extLst>
           </p:cNvPr>
@@ -3378,7 +3377,7 @@
           <a:p>
             <a:fld id="{CD63B9D5-DAC7-4B08-8CEE-404A79EB8B50}" type="datetimeFigureOut">
               <a:rPr lang="en-GB" smtClean="0"/>
-              <a:t>08/04/2020</a:t>
+              <a:t>20/09/2024</a:t>
             </a:fld>
             <a:endParaRPr lang="en-GB"/>
           </a:p>
@@ -3389,7 +3388,7 @@
           <p:cNvPr id="5" name="Footer Placeholder 4">
             <a:extLst>
               <a:ext uri="{FF2B5EF4-FFF2-40B4-BE49-F238E27FC236}">
-                <a16:creationId xmlns:a16="http://schemas.microsoft.com/office/drawing/2014/main" xmlns="" id="{3C6C922C-A814-44FA-85E1-132D039C1AD6}"/>
+                <a16:creationId xmlns:a16="http://schemas.microsoft.com/office/drawing/2014/main" id="{3C6C922C-A814-44FA-85E1-132D039C1AD6}"/>
               </a:ext>
             </a:extLst>
           </p:cNvPr>
@@ -3432,7 +3431,7 @@
           <p:cNvPr id="6" name="Slide Number Placeholder 5">
             <a:extLst>
               <a:ext uri="{FF2B5EF4-FFF2-40B4-BE49-F238E27FC236}">
-                <a16:creationId xmlns:a16="http://schemas.microsoft.com/office/drawing/2014/main" xmlns="" id="{D661AED9-B417-438B-B806-A1B24189790D}"/>
+                <a16:creationId xmlns:a16="http://schemas.microsoft.com/office/drawing/2014/main" id="{D661AED9-B417-438B-B806-A1B24189790D}"/>
               </a:ext>
             </a:extLst>
           </p:cNvPr>
@@ -3800,7 +3799,7 @@
           <p:cNvPr id="109" name="Straight Connector 108">
             <a:extLst>
               <a:ext uri="{FF2B5EF4-FFF2-40B4-BE49-F238E27FC236}">
-                <a16:creationId xmlns:a16="http://schemas.microsoft.com/office/drawing/2014/main" xmlns="" id="{77EBEB4C-9358-4363-8812-3F87F31BA3D8}"/>
+                <a16:creationId xmlns:a16="http://schemas.microsoft.com/office/drawing/2014/main" id="{77EBEB4C-9358-4363-8812-3F87F31BA3D8}"/>
               </a:ext>
             </a:extLst>
           </p:cNvPr>
@@ -3832,7 +3831,7 @@
           <p:cNvPr id="5" name="Rounded Rectangle 55">
             <a:extLst>
               <a:ext uri="{FF2B5EF4-FFF2-40B4-BE49-F238E27FC236}">
-                <a16:creationId xmlns:a16="http://schemas.microsoft.com/office/drawing/2014/main" xmlns="" id="{4A5EA21A-B517-4E62-A38B-3311846757EF}"/>
+                <a16:creationId xmlns:a16="http://schemas.microsoft.com/office/drawing/2014/main" id="{4A5EA21A-B517-4E62-A38B-3311846757EF}"/>
               </a:ext>
             </a:extLst>
           </p:cNvPr>
@@ -3903,7 +3902,7 @@
           <p:cNvPr id="6" name="Rounded Rectangle 55">
             <a:extLst>
               <a:ext uri="{FF2B5EF4-FFF2-40B4-BE49-F238E27FC236}">
-                <a16:creationId xmlns:a16="http://schemas.microsoft.com/office/drawing/2014/main" xmlns="" id="{E2480A1E-B4E5-40BB-8533-46532A737389}"/>
+                <a16:creationId xmlns:a16="http://schemas.microsoft.com/office/drawing/2014/main" id="{E2480A1E-B4E5-40BB-8533-46532A737389}"/>
               </a:ext>
             </a:extLst>
           </p:cNvPr>
@@ -3974,7 +3973,7 @@
           <p:cNvPr id="8" name="Rounded Rectangle 167">
             <a:extLst>
               <a:ext uri="{FF2B5EF4-FFF2-40B4-BE49-F238E27FC236}">
-                <a16:creationId xmlns:a16="http://schemas.microsoft.com/office/drawing/2014/main" xmlns="" id="{AA3214B3-646B-4C60-874B-CC098979DDCB}"/>
+                <a16:creationId xmlns:a16="http://schemas.microsoft.com/office/drawing/2014/main" id="{AA3214B3-646B-4C60-874B-CC098979DDCB}"/>
               </a:ext>
             </a:extLst>
           </p:cNvPr>
@@ -4049,7 +4048,7 @@
           <p:cNvPr id="12" name="Straight Connector 11">
             <a:extLst>
               <a:ext uri="{FF2B5EF4-FFF2-40B4-BE49-F238E27FC236}">
-                <a16:creationId xmlns:a16="http://schemas.microsoft.com/office/drawing/2014/main" xmlns="" id="{D8D5512F-026B-41C6-BF50-275A07B428A9}"/>
+                <a16:creationId xmlns:a16="http://schemas.microsoft.com/office/drawing/2014/main" id="{D8D5512F-026B-41C6-BF50-275A07B428A9}"/>
               </a:ext>
             </a:extLst>
           </p:cNvPr>
@@ -4086,7 +4085,7 @@
           <p:cNvPr id="15" name="Straight Connector 14">
             <a:extLst>
               <a:ext uri="{FF2B5EF4-FFF2-40B4-BE49-F238E27FC236}">
-                <a16:creationId xmlns:a16="http://schemas.microsoft.com/office/drawing/2014/main" xmlns="" id="{6282449E-F895-410F-8614-62C6739CF51F}"/>
+                <a16:creationId xmlns:a16="http://schemas.microsoft.com/office/drawing/2014/main" id="{6282449E-F895-410F-8614-62C6739CF51F}"/>
               </a:ext>
             </a:extLst>
           </p:cNvPr>
@@ -4123,7 +4122,7 @@
           <p:cNvPr id="18" name="Straight Connector 17">
             <a:extLst>
               <a:ext uri="{FF2B5EF4-FFF2-40B4-BE49-F238E27FC236}">
-                <a16:creationId xmlns:a16="http://schemas.microsoft.com/office/drawing/2014/main" xmlns="" id="{9CC9F9E8-CBE4-4A9F-8C43-9EFF102B692A}"/>
+                <a16:creationId xmlns:a16="http://schemas.microsoft.com/office/drawing/2014/main" id="{9CC9F9E8-CBE4-4A9F-8C43-9EFF102B692A}"/>
               </a:ext>
             </a:extLst>
           </p:cNvPr>
@@ -4160,7 +4159,7 @@
           <p:cNvPr id="21" name="Straight Connector 20">
             <a:extLst>
               <a:ext uri="{FF2B5EF4-FFF2-40B4-BE49-F238E27FC236}">
-                <a16:creationId xmlns:a16="http://schemas.microsoft.com/office/drawing/2014/main" xmlns="" id="{6813BE6C-254F-4092-AEC2-E661C58CF52F}"/>
+                <a16:creationId xmlns:a16="http://schemas.microsoft.com/office/drawing/2014/main" id="{6813BE6C-254F-4092-AEC2-E661C58CF52F}"/>
               </a:ext>
             </a:extLst>
           </p:cNvPr>
@@ -4198,7 +4197,7 @@
           <p:cNvPr id="25" name="Straight Connector 24">
             <a:extLst>
               <a:ext uri="{FF2B5EF4-FFF2-40B4-BE49-F238E27FC236}">
-                <a16:creationId xmlns:a16="http://schemas.microsoft.com/office/drawing/2014/main" xmlns="" id="{D4A6C4D9-A95C-48A7-9BD7-143A3A45576A}"/>
+                <a16:creationId xmlns:a16="http://schemas.microsoft.com/office/drawing/2014/main" id="{D4A6C4D9-A95C-48A7-9BD7-143A3A45576A}"/>
               </a:ext>
             </a:extLst>
           </p:cNvPr>
@@ -4236,7 +4235,7 @@
           <p:cNvPr id="29" name="Rounded Rectangle 62">
             <a:extLst>
               <a:ext uri="{FF2B5EF4-FFF2-40B4-BE49-F238E27FC236}">
-                <a16:creationId xmlns:a16="http://schemas.microsoft.com/office/drawing/2014/main" xmlns="" id="{49A2EAC0-FC35-4951-ABE9-F61076C2F8FB}"/>
+                <a16:creationId xmlns:a16="http://schemas.microsoft.com/office/drawing/2014/main" id="{49A2EAC0-FC35-4951-ABE9-F61076C2F8FB}"/>
               </a:ext>
             </a:extLst>
           </p:cNvPr>
@@ -4309,7 +4308,7 @@
           <p:cNvPr id="30" name="Rounded Rectangle 62">
             <a:extLst>
               <a:ext uri="{FF2B5EF4-FFF2-40B4-BE49-F238E27FC236}">
-                <a16:creationId xmlns:a16="http://schemas.microsoft.com/office/drawing/2014/main" xmlns="" id="{3F6E10D4-26BB-4DCC-8CBA-55A4F2B5F5D3}"/>
+                <a16:creationId xmlns:a16="http://schemas.microsoft.com/office/drawing/2014/main" id="{3F6E10D4-26BB-4DCC-8CBA-55A4F2B5F5D3}"/>
               </a:ext>
             </a:extLst>
           </p:cNvPr>
@@ -4382,7 +4381,7 @@
           <p:cNvPr id="32" name="Rounded Rectangle 55">
             <a:extLst>
               <a:ext uri="{FF2B5EF4-FFF2-40B4-BE49-F238E27FC236}">
-                <a16:creationId xmlns:a16="http://schemas.microsoft.com/office/drawing/2014/main" xmlns="" id="{3B4F2981-3CEE-4B69-A2EB-5B26B45CBEF8}"/>
+                <a16:creationId xmlns:a16="http://schemas.microsoft.com/office/drawing/2014/main" id="{3B4F2981-3CEE-4B69-A2EB-5B26B45CBEF8}"/>
               </a:ext>
             </a:extLst>
           </p:cNvPr>
@@ -4456,7 +4455,7 @@
           <p:cNvPr id="33" name="Rounded Rectangle 55">
             <a:extLst>
               <a:ext uri="{FF2B5EF4-FFF2-40B4-BE49-F238E27FC236}">
-                <a16:creationId xmlns:a16="http://schemas.microsoft.com/office/drawing/2014/main" xmlns="" id="{2CE9FA87-B451-4D28-B959-FD7C99FBF615}"/>
+                <a16:creationId xmlns:a16="http://schemas.microsoft.com/office/drawing/2014/main" id="{2CE9FA87-B451-4D28-B959-FD7C99FBF615}"/>
               </a:ext>
             </a:extLst>
           </p:cNvPr>
@@ -4530,7 +4529,7 @@
           <p:cNvPr id="34" name="Rounded Rectangle 55">
             <a:extLst>
               <a:ext uri="{FF2B5EF4-FFF2-40B4-BE49-F238E27FC236}">
-                <a16:creationId xmlns:a16="http://schemas.microsoft.com/office/drawing/2014/main" xmlns="" id="{6BFA35F9-6AD9-4110-AF0B-D5436B39DF0A}"/>
+                <a16:creationId xmlns:a16="http://schemas.microsoft.com/office/drawing/2014/main" id="{6BFA35F9-6AD9-4110-AF0B-D5436B39DF0A}"/>
               </a:ext>
             </a:extLst>
           </p:cNvPr>
@@ -4612,7 +4611,7 @@
           <p:cNvPr id="36" name="Rounded Rectangle 62">
             <a:extLst>
               <a:ext uri="{FF2B5EF4-FFF2-40B4-BE49-F238E27FC236}">
-                <a16:creationId xmlns:a16="http://schemas.microsoft.com/office/drawing/2014/main" xmlns="" id="{0FB0C89C-A7E3-4B12-B57E-98E543828301}"/>
+                <a16:creationId xmlns:a16="http://schemas.microsoft.com/office/drawing/2014/main" id="{0FB0C89C-A7E3-4B12-B57E-98E543828301}"/>
               </a:ext>
             </a:extLst>
           </p:cNvPr>
@@ -4685,7 +4684,7 @@
           <p:cNvPr id="16" name="Rounded Rectangle 109">
             <a:extLst>
               <a:ext uri="{FF2B5EF4-FFF2-40B4-BE49-F238E27FC236}">
-                <a16:creationId xmlns:a16="http://schemas.microsoft.com/office/drawing/2014/main" xmlns="" id="{6BA292EC-359E-48F8-BD1C-7EE5EF6E1D84}"/>
+                <a16:creationId xmlns:a16="http://schemas.microsoft.com/office/drawing/2014/main" id="{6BA292EC-359E-48F8-BD1C-7EE5EF6E1D84}"/>
               </a:ext>
             </a:extLst>
           </p:cNvPr>
@@ -4758,7 +4757,7 @@
           <p:cNvPr id="28" name="Straight Connector 27">
             <a:extLst>
               <a:ext uri="{FF2B5EF4-FFF2-40B4-BE49-F238E27FC236}">
-                <a16:creationId xmlns:a16="http://schemas.microsoft.com/office/drawing/2014/main" xmlns="" id="{ECED264B-5439-4D34-ACBE-66449762C908}"/>
+                <a16:creationId xmlns:a16="http://schemas.microsoft.com/office/drawing/2014/main" id="{ECED264B-5439-4D34-ACBE-66449762C908}"/>
               </a:ext>
             </a:extLst>
           </p:cNvPr>
@@ -4790,7 +4789,7 @@
           <p:cNvPr id="35" name="Straight Connector 34">
             <a:extLst>
               <a:ext uri="{FF2B5EF4-FFF2-40B4-BE49-F238E27FC236}">
-                <a16:creationId xmlns:a16="http://schemas.microsoft.com/office/drawing/2014/main" xmlns="" id="{C1758388-0FDF-4391-86C8-A2A12BF20FF8}"/>
+                <a16:creationId xmlns:a16="http://schemas.microsoft.com/office/drawing/2014/main" id="{C1758388-0FDF-4391-86C8-A2A12BF20FF8}"/>
               </a:ext>
             </a:extLst>
           </p:cNvPr>
@@ -4822,7 +4821,7 @@
           <p:cNvPr id="38" name="Straight Connector 37">
             <a:extLst>
               <a:ext uri="{FF2B5EF4-FFF2-40B4-BE49-F238E27FC236}">
-                <a16:creationId xmlns:a16="http://schemas.microsoft.com/office/drawing/2014/main" xmlns="" id="{3473BE71-919D-4A48-8F74-7B5D2AC8B799}"/>
+                <a16:creationId xmlns:a16="http://schemas.microsoft.com/office/drawing/2014/main" id="{3473BE71-919D-4A48-8F74-7B5D2AC8B799}"/>
               </a:ext>
             </a:extLst>
           </p:cNvPr>
@@ -4854,7 +4853,7 @@
           <p:cNvPr id="49" name="Straight Connector 48">
             <a:extLst>
               <a:ext uri="{FF2B5EF4-FFF2-40B4-BE49-F238E27FC236}">
-                <a16:creationId xmlns:a16="http://schemas.microsoft.com/office/drawing/2014/main" xmlns="" id="{9F259B1E-D6F1-4ED1-BC69-90D3F60D8D41}"/>
+                <a16:creationId xmlns:a16="http://schemas.microsoft.com/office/drawing/2014/main" id="{9F259B1E-D6F1-4ED1-BC69-90D3F60D8D41}"/>
               </a:ext>
             </a:extLst>
           </p:cNvPr>
@@ -4886,7 +4885,7 @@
           <p:cNvPr id="54" name="Rounded Rectangle 109">
             <a:extLst>
               <a:ext uri="{FF2B5EF4-FFF2-40B4-BE49-F238E27FC236}">
-                <a16:creationId xmlns:a16="http://schemas.microsoft.com/office/drawing/2014/main" xmlns="" id="{AAD22BA3-0841-483F-828B-FA09121D3018}"/>
+                <a16:creationId xmlns:a16="http://schemas.microsoft.com/office/drawing/2014/main" id="{AAD22BA3-0841-483F-828B-FA09121D3018}"/>
               </a:ext>
             </a:extLst>
           </p:cNvPr>
@@ -4959,7 +4958,7 @@
           <p:cNvPr id="55" name="Straight Connector 54">
             <a:extLst>
               <a:ext uri="{FF2B5EF4-FFF2-40B4-BE49-F238E27FC236}">
-                <a16:creationId xmlns:a16="http://schemas.microsoft.com/office/drawing/2014/main" xmlns="" id="{F5545CE2-D8CD-4E0D-81E4-1847581CD893}"/>
+                <a16:creationId xmlns:a16="http://schemas.microsoft.com/office/drawing/2014/main" id="{F5545CE2-D8CD-4E0D-81E4-1847581CD893}"/>
               </a:ext>
             </a:extLst>
           </p:cNvPr>
@@ -4991,7 +4990,7 @@
           <p:cNvPr id="56" name="Straight Connector 55">
             <a:extLst>
               <a:ext uri="{FF2B5EF4-FFF2-40B4-BE49-F238E27FC236}">
-                <a16:creationId xmlns:a16="http://schemas.microsoft.com/office/drawing/2014/main" xmlns="" id="{6D8CD880-521C-4DA3-AF0A-284E05BB3E3E}"/>
+                <a16:creationId xmlns:a16="http://schemas.microsoft.com/office/drawing/2014/main" id="{6D8CD880-521C-4DA3-AF0A-284E05BB3E3E}"/>
               </a:ext>
             </a:extLst>
           </p:cNvPr>
@@ -5023,7 +5022,7 @@
           <p:cNvPr id="57" name="Straight Connector 56">
             <a:extLst>
               <a:ext uri="{FF2B5EF4-FFF2-40B4-BE49-F238E27FC236}">
-                <a16:creationId xmlns:a16="http://schemas.microsoft.com/office/drawing/2014/main" xmlns="" id="{D5474405-513C-405E-81B1-964510BC3329}"/>
+                <a16:creationId xmlns:a16="http://schemas.microsoft.com/office/drawing/2014/main" id="{D5474405-513C-405E-81B1-964510BC3329}"/>
               </a:ext>
             </a:extLst>
           </p:cNvPr>
@@ -5055,7 +5054,7 @@
           <p:cNvPr id="58" name="Straight Connector 57">
             <a:extLst>
               <a:ext uri="{FF2B5EF4-FFF2-40B4-BE49-F238E27FC236}">
-                <a16:creationId xmlns:a16="http://schemas.microsoft.com/office/drawing/2014/main" xmlns="" id="{0905E1C2-B63B-42B8-A087-0D3F5DC17A1D}"/>
+                <a16:creationId xmlns:a16="http://schemas.microsoft.com/office/drawing/2014/main" id="{0905E1C2-B63B-42B8-A087-0D3F5DC17A1D}"/>
               </a:ext>
             </a:extLst>
           </p:cNvPr>
@@ -5087,7 +5086,7 @@
           <p:cNvPr id="62" name="Rounded Rectangle 101">
             <a:extLst>
               <a:ext uri="{FF2B5EF4-FFF2-40B4-BE49-F238E27FC236}">
-                <a16:creationId xmlns:a16="http://schemas.microsoft.com/office/drawing/2014/main" xmlns="" id="{FF61B63C-131F-4DFA-883D-8346E52CF633}"/>
+                <a16:creationId xmlns:a16="http://schemas.microsoft.com/office/drawing/2014/main" id="{FF61B63C-131F-4DFA-883D-8346E52CF633}"/>
               </a:ext>
             </a:extLst>
           </p:cNvPr>
@@ -5158,7 +5157,7 @@
           <p:cNvPr id="59" name="Straight Connector 58">
             <a:extLst>
               <a:ext uri="{FF2B5EF4-FFF2-40B4-BE49-F238E27FC236}">
-                <a16:creationId xmlns:a16="http://schemas.microsoft.com/office/drawing/2014/main" xmlns="" id="{5833AD24-CA26-40C2-B29A-6D5B97D02AB7}"/>
+                <a16:creationId xmlns:a16="http://schemas.microsoft.com/office/drawing/2014/main" id="{5833AD24-CA26-40C2-B29A-6D5B97D02AB7}"/>
               </a:ext>
             </a:extLst>
           </p:cNvPr>
@@ -5190,7 +5189,7 @@
           <p:cNvPr id="60" name="Straight Connector 59">
             <a:extLst>
               <a:ext uri="{FF2B5EF4-FFF2-40B4-BE49-F238E27FC236}">
-                <a16:creationId xmlns:a16="http://schemas.microsoft.com/office/drawing/2014/main" xmlns="" id="{3A590189-0772-4808-A51E-5D91575BFE25}"/>
+                <a16:creationId xmlns:a16="http://schemas.microsoft.com/office/drawing/2014/main" id="{3A590189-0772-4808-A51E-5D91575BFE25}"/>
               </a:ext>
             </a:extLst>
           </p:cNvPr>
@@ -5222,7 +5221,7 @@
           <p:cNvPr id="63" name="Rounded Rectangle 101">
             <a:extLst>
               <a:ext uri="{FF2B5EF4-FFF2-40B4-BE49-F238E27FC236}">
-                <a16:creationId xmlns:a16="http://schemas.microsoft.com/office/drawing/2014/main" xmlns="" id="{64D599D4-CCF4-4097-87A8-23AF92B22E0E}"/>
+                <a16:creationId xmlns:a16="http://schemas.microsoft.com/office/drawing/2014/main" id="{64D599D4-CCF4-4097-87A8-23AF92B22E0E}"/>
               </a:ext>
             </a:extLst>
           </p:cNvPr>
@@ -5293,7 +5292,7 @@
           <p:cNvPr id="39" name="Straight Connector 38">
             <a:extLst>
               <a:ext uri="{FF2B5EF4-FFF2-40B4-BE49-F238E27FC236}">
-                <a16:creationId xmlns:a16="http://schemas.microsoft.com/office/drawing/2014/main" xmlns="" id="{D326159B-CEFC-4729-A509-A9B9C76D6608}"/>
+                <a16:creationId xmlns:a16="http://schemas.microsoft.com/office/drawing/2014/main" id="{D326159B-CEFC-4729-A509-A9B9C76D6608}"/>
               </a:ext>
             </a:extLst>
           </p:cNvPr>
@@ -5325,7 +5324,7 @@
           <p:cNvPr id="65" name="TextBox 64">
             <a:extLst>
               <a:ext uri="{FF2B5EF4-FFF2-40B4-BE49-F238E27FC236}">
-                <a16:creationId xmlns:a16="http://schemas.microsoft.com/office/drawing/2014/main" xmlns="" id="{275A8AB9-1BAB-43E1-9559-EDF0BCF8D071}"/>
+                <a16:creationId xmlns:a16="http://schemas.microsoft.com/office/drawing/2014/main" id="{275A8AB9-1BAB-43E1-9559-EDF0BCF8D071}"/>
               </a:ext>
             </a:extLst>
           </p:cNvPr>
@@ -5432,7 +5431,7 @@
           <p:cNvPr id="66" name="TextBox 65">
             <a:extLst>
               <a:ext uri="{FF2B5EF4-FFF2-40B4-BE49-F238E27FC236}">
-                <a16:creationId xmlns:a16="http://schemas.microsoft.com/office/drawing/2014/main" xmlns="" id="{8E0DBEBC-B1F4-42A5-AC52-02D36426541B}"/>
+                <a16:creationId xmlns:a16="http://schemas.microsoft.com/office/drawing/2014/main" id="{8E0DBEBC-B1F4-42A5-AC52-02D36426541B}"/>
               </a:ext>
             </a:extLst>
           </p:cNvPr>
@@ -5542,7 +5541,7 @@
           <p:cNvPr id="67" name="TextBox 66">
             <a:extLst>
               <a:ext uri="{FF2B5EF4-FFF2-40B4-BE49-F238E27FC236}">
-                <a16:creationId xmlns:a16="http://schemas.microsoft.com/office/drawing/2014/main" xmlns="" id="{9C65F887-973B-4BDA-BCFC-C509168C7FBB}"/>
+                <a16:creationId xmlns:a16="http://schemas.microsoft.com/office/drawing/2014/main" id="{9C65F887-973B-4BDA-BCFC-C509168C7FBB}"/>
               </a:ext>
             </a:extLst>
           </p:cNvPr>
@@ -5607,7 +5606,7 @@
           <p:cNvPr id="3" name="Connector: Elbow 2">
             <a:extLst>
               <a:ext uri="{FF2B5EF4-FFF2-40B4-BE49-F238E27FC236}">
-                <a16:creationId xmlns:a16="http://schemas.microsoft.com/office/drawing/2014/main" xmlns="" id="{0A53337A-9473-4D38-A6B5-87D0AAB6BE52}"/>
+                <a16:creationId xmlns:a16="http://schemas.microsoft.com/office/drawing/2014/main" id="{0A53337A-9473-4D38-A6B5-87D0AAB6BE52}"/>
               </a:ext>
             </a:extLst>
           </p:cNvPr>
@@ -5629,10 +5628,7 @@
           <a:noFill/>
           <a:ln w="28575" cap="flat" cmpd="sng" algn="ctr">
             <a:solidFill>
-              <a:srgbClr val="717D83">
-                <a:lumMod val="60000"/>
-                <a:lumOff val="40000"/>
-              </a:srgbClr>
+              <a:srgbClr val="F59682"/>
             </a:solidFill>
             <a:prstDash val="solid"/>
             <a:headEnd type="none"/>
@@ -5643,36 +5639,31 @@
       </p:cxnSp>
       <p:cxnSp>
         <p:nvCxnSpPr>
-          <p:cNvPr id="68" name="Connector: Elbow 67">
-            <a:extLst>
-              <a:ext uri="{FF2B5EF4-FFF2-40B4-BE49-F238E27FC236}">
-                <a16:creationId xmlns:a16="http://schemas.microsoft.com/office/drawing/2014/main" xmlns="" id="{75BF2707-8371-4F45-89E0-F7D7B29407FE}"/>
+          <p:cNvPr id="76" name="Connector: Elbow 75">
+            <a:extLst>
+              <a:ext uri="{FF2B5EF4-FFF2-40B4-BE49-F238E27FC236}">
+                <a16:creationId xmlns:a16="http://schemas.microsoft.com/office/drawing/2014/main" id="{FF850BFB-2E74-4A12-9BE5-CFBFBC81CF67}"/>
               </a:ext>
             </a:extLst>
           </p:cNvPr>
           <p:cNvCxnSpPr>
             <a:cxnSpLocks/>
-            <a:endCxn id="34" idx="3"/>
+            <a:endCxn id="16" idx="1"/>
           </p:cNvCxnSpPr>
           <p:nvPr/>
         </p:nvCxnSpPr>
         <p:spPr>
-          <a:xfrm rot="10800000" flipV="1">
-            <a:off x="2295606" y="1823720"/>
-            <a:ext cx="1385971" cy="1383436"/>
-          </a:xfrm>
-          <a:prstGeom prst="bentConnector3">
-            <a:avLst>
-              <a:gd name="adj1" fmla="val 50000"/>
-            </a:avLst>
+          <a:xfrm rot="16200000" flipH="1">
+            <a:off x="1534977" y="3756478"/>
+            <a:ext cx="3683844" cy="220916"/>
+          </a:xfrm>
+          <a:prstGeom prst="bentConnector2">
+            <a:avLst/>
           </a:prstGeom>
           <a:noFill/>
           <a:ln w="28575" cap="flat" cmpd="sng" algn="ctr">
             <a:solidFill>
-              <a:srgbClr val="717D83">
-                <a:lumMod val="60000"/>
-                <a:lumOff val="40000"/>
-              </a:srgbClr>
+              <a:srgbClr val="F59682"/>
             </a:solidFill>
             <a:prstDash val="solid"/>
             <a:headEnd type="none"/>
@@ -5683,34 +5674,97 @@
       </p:cxnSp>
       <p:cxnSp>
         <p:nvCxnSpPr>
-          <p:cNvPr id="76" name="Connector: Elbow 75">
-            <a:extLst>
-              <a:ext uri="{FF2B5EF4-FFF2-40B4-BE49-F238E27FC236}">
-                <a16:creationId xmlns:a16="http://schemas.microsoft.com/office/drawing/2014/main" xmlns="" id="{FF850BFB-2E74-4A12-9BE5-CFBFBC81CF67}"/>
-              </a:ext>
-            </a:extLst>
-          </p:cNvPr>
-          <p:cNvCxnSpPr>
-            <a:cxnSpLocks/>
-            <a:endCxn id="16" idx="1"/>
-          </p:cNvCxnSpPr>
+          <p:cNvPr id="85" name="Straight Connector 84">
+            <a:extLst>
+              <a:ext uri="{FF2B5EF4-FFF2-40B4-BE49-F238E27FC236}">
+                <a16:creationId xmlns:a16="http://schemas.microsoft.com/office/drawing/2014/main" id="{468880D6-1673-47C0-A3FD-50A837829757}"/>
+              </a:ext>
+            </a:extLst>
+          </p:cNvPr>
+          <p:cNvCxnSpPr/>
           <p:nvPr/>
         </p:nvCxnSpPr>
         <p:spPr>
-          <a:xfrm rot="16200000" flipH="1">
-            <a:off x="1534977" y="3756478"/>
-            <a:ext cx="3683844" cy="220916"/>
-          </a:xfrm>
-          <a:prstGeom prst="bentConnector2">
+          <a:xfrm>
+            <a:off x="3266440" y="2042160"/>
+            <a:ext cx="415137" cy="0"/>
+          </a:xfrm>
+          <a:prstGeom prst="line">
             <a:avLst/>
           </a:prstGeom>
           <a:noFill/>
           <a:ln w="28575" cap="flat" cmpd="sng" algn="ctr">
             <a:solidFill>
-              <a:srgbClr val="717D83">
-                <a:lumMod val="60000"/>
-                <a:lumOff val="40000"/>
-              </a:srgbClr>
+              <a:srgbClr val="F59682"/>
+            </a:solidFill>
+            <a:prstDash val="solid"/>
+            <a:headEnd type="none"/>
+            <a:tailEnd type="none"/>
+          </a:ln>
+          <a:effectLst/>
+        </p:spPr>
+      </p:cxnSp>
+      <p:cxnSp>
+        <p:nvCxnSpPr>
+          <p:cNvPr id="94" name="Straight Connector 93">
+            <a:extLst>
+              <a:ext uri="{FF2B5EF4-FFF2-40B4-BE49-F238E27FC236}">
+                <a16:creationId xmlns:a16="http://schemas.microsoft.com/office/drawing/2014/main" id="{6CEA1823-CB41-4A46-AD93-BC472B2B8A88}"/>
+              </a:ext>
+            </a:extLst>
+          </p:cNvPr>
+          <p:cNvCxnSpPr>
+            <a:cxnSpLocks/>
+          </p:cNvCxnSpPr>
+          <p:nvPr/>
+        </p:nvCxnSpPr>
+        <p:spPr>
+          <a:xfrm>
+            <a:off x="5016227" y="3505706"/>
+            <a:ext cx="558705" cy="0"/>
+          </a:xfrm>
+          <a:prstGeom prst="line">
+            <a:avLst/>
+          </a:prstGeom>
+          <a:noFill/>
+          <a:ln w="28575" cap="flat" cmpd="sng" algn="ctr">
+            <a:solidFill>
+              <a:srgbClr val="F59682"/>
+            </a:solidFill>
+            <a:prstDash val="solid"/>
+            <a:headEnd type="none"/>
+            <a:tailEnd type="none"/>
+          </a:ln>
+          <a:effectLst/>
+        </p:spPr>
+      </p:cxnSp>
+      <p:cxnSp>
+        <p:nvCxnSpPr>
+          <p:cNvPr id="104" name="Straight Arrow Connector 103">
+            <a:extLst>
+              <a:ext uri="{FF2B5EF4-FFF2-40B4-BE49-F238E27FC236}">
+                <a16:creationId xmlns:a16="http://schemas.microsoft.com/office/drawing/2014/main" id="{AB043055-335F-4764-B161-D75116F82110}"/>
+              </a:ext>
+            </a:extLst>
+          </p:cNvPr>
+          <p:cNvCxnSpPr>
+            <a:cxnSpLocks/>
+            <a:endCxn id="32" idx="1"/>
+          </p:cNvCxnSpPr>
+          <p:nvPr/>
+        </p:nvCxnSpPr>
+        <p:spPr>
+          <a:xfrm flipV="1">
+            <a:off x="5021560" y="2803873"/>
+            <a:ext cx="1171809" cy="1414"/>
+          </a:xfrm>
+          <a:prstGeom prst="straightConnector1">
+            <a:avLst/>
+          </a:prstGeom>
+          <a:noFill/>
+          <a:ln w="28575" cap="flat" cmpd="sng" algn="ctr">
+            <a:solidFill>
+              <a:srgbClr val="F59682"/>
             </a:solidFill>
             <a:prstDash val="solid"/>
             <a:headEnd type="none"/>
@@ -5719,160 +5773,12 @@
           <a:effectLst/>
         </p:spPr>
       </p:cxnSp>
-      <p:cxnSp>
-        <p:nvCxnSpPr>
-          <p:cNvPr id="85" name="Straight Connector 84">
-            <a:extLst>
-              <a:ext uri="{FF2B5EF4-FFF2-40B4-BE49-F238E27FC236}">
-                <a16:creationId xmlns:a16="http://schemas.microsoft.com/office/drawing/2014/main" xmlns="" id="{468880D6-1673-47C0-A3FD-50A837829757}"/>
-              </a:ext>
-            </a:extLst>
-          </p:cNvPr>
-          <p:cNvCxnSpPr/>
-          <p:nvPr/>
-        </p:nvCxnSpPr>
-        <p:spPr>
-          <a:xfrm>
-            <a:off x="3266440" y="2042160"/>
-            <a:ext cx="415137" cy="0"/>
-          </a:xfrm>
-          <a:prstGeom prst="line">
-            <a:avLst/>
-          </a:prstGeom>
-          <a:noFill/>
-          <a:ln w="28575" cap="flat" cmpd="sng" algn="ctr">
-            <a:solidFill>
-              <a:srgbClr val="717D83">
-                <a:lumMod val="60000"/>
-                <a:lumOff val="40000"/>
-              </a:srgbClr>
-            </a:solidFill>
-            <a:prstDash val="solid"/>
-            <a:headEnd type="none"/>
-            <a:tailEnd type="none"/>
-          </a:ln>
-          <a:effectLst/>
-        </p:spPr>
-      </p:cxnSp>
-      <p:cxnSp>
-        <p:nvCxnSpPr>
-          <p:cNvPr id="91" name="Connector: Elbow 90">
-            <a:extLst>
-              <a:ext uri="{FF2B5EF4-FFF2-40B4-BE49-F238E27FC236}">
-                <a16:creationId xmlns:a16="http://schemas.microsoft.com/office/drawing/2014/main" xmlns="" id="{EC350CC8-9E26-4073-8CC6-D120EDFE2800}"/>
-              </a:ext>
-            </a:extLst>
-          </p:cNvPr>
-          <p:cNvCxnSpPr>
-            <a:cxnSpLocks/>
-            <a:endCxn id="16" idx="3"/>
-          </p:cNvCxnSpPr>
-          <p:nvPr/>
-        </p:nvCxnSpPr>
-        <p:spPr>
-          <a:xfrm rot="5400000">
-            <a:off x="4211808" y="4417310"/>
-            <a:ext cx="2295098" cy="287999"/>
-          </a:xfrm>
-          <a:prstGeom prst="bentConnector2">
-            <a:avLst/>
-          </a:prstGeom>
-          <a:noFill/>
-          <a:ln w="28575" cap="flat" cmpd="sng" algn="ctr">
-            <a:solidFill>
-              <a:srgbClr val="717D83">
-                <a:lumMod val="60000"/>
-                <a:lumOff val="40000"/>
-              </a:srgbClr>
-            </a:solidFill>
-            <a:prstDash val="solid"/>
-            <a:headEnd type="none"/>
-            <a:tailEnd type="triangle"/>
-          </a:ln>
-          <a:effectLst/>
-        </p:spPr>
-      </p:cxnSp>
-      <p:cxnSp>
-        <p:nvCxnSpPr>
-          <p:cNvPr id="94" name="Straight Connector 93">
-            <a:extLst>
-              <a:ext uri="{FF2B5EF4-FFF2-40B4-BE49-F238E27FC236}">
-                <a16:creationId xmlns:a16="http://schemas.microsoft.com/office/drawing/2014/main" xmlns="" id="{6CEA1823-CB41-4A46-AD93-BC472B2B8A88}"/>
-              </a:ext>
-            </a:extLst>
-          </p:cNvPr>
-          <p:cNvCxnSpPr>
-            <a:cxnSpLocks/>
-          </p:cNvCxnSpPr>
-          <p:nvPr/>
-        </p:nvCxnSpPr>
-        <p:spPr>
-          <a:xfrm>
-            <a:off x="5021136" y="3428998"/>
-            <a:ext cx="482221" cy="0"/>
-          </a:xfrm>
-          <a:prstGeom prst="line">
-            <a:avLst/>
-          </a:prstGeom>
-          <a:noFill/>
-          <a:ln w="28575" cap="flat" cmpd="sng" algn="ctr">
-            <a:solidFill>
-              <a:srgbClr val="717D83">
-                <a:lumMod val="60000"/>
-                <a:lumOff val="40000"/>
-              </a:srgbClr>
-            </a:solidFill>
-            <a:prstDash val="solid"/>
-            <a:headEnd type="none"/>
-            <a:tailEnd type="none"/>
-          </a:ln>
-          <a:effectLst/>
-        </p:spPr>
-      </p:cxnSp>
-      <p:cxnSp>
-        <p:nvCxnSpPr>
-          <p:cNvPr id="104" name="Straight Arrow Connector 103">
-            <a:extLst>
-              <a:ext uri="{FF2B5EF4-FFF2-40B4-BE49-F238E27FC236}">
-                <a16:creationId xmlns:a16="http://schemas.microsoft.com/office/drawing/2014/main" xmlns="" id="{AB043055-335F-4764-B161-D75116F82110}"/>
-              </a:ext>
-            </a:extLst>
-          </p:cNvPr>
-          <p:cNvCxnSpPr>
-            <a:cxnSpLocks/>
-            <a:endCxn id="32" idx="1"/>
-          </p:cNvCxnSpPr>
-          <p:nvPr/>
-        </p:nvCxnSpPr>
-        <p:spPr>
-          <a:xfrm flipV="1">
-            <a:off x="5021560" y="2803873"/>
-            <a:ext cx="1171809" cy="1414"/>
-          </a:xfrm>
-          <a:prstGeom prst="straightConnector1">
-            <a:avLst/>
-          </a:prstGeom>
-          <a:noFill/>
-          <a:ln w="28575" cap="flat" cmpd="sng" algn="ctr">
-            <a:solidFill>
-              <a:srgbClr val="717D83">
-                <a:lumMod val="60000"/>
-                <a:lumOff val="40000"/>
-              </a:srgbClr>
-            </a:solidFill>
-            <a:prstDash val="solid"/>
-            <a:headEnd type="none"/>
-            <a:tailEnd type="triangle"/>
-          </a:ln>
-          <a:effectLst/>
-        </p:spPr>
-      </p:cxnSp>
       <p:sp>
         <p:nvSpPr>
           <p:cNvPr id="120" name="TextBox 119">
             <a:extLst>
               <a:ext uri="{FF2B5EF4-FFF2-40B4-BE49-F238E27FC236}">
-                <a16:creationId xmlns:a16="http://schemas.microsoft.com/office/drawing/2014/main" xmlns="" id="{8198FE9E-FD9E-45D1-9F80-E56F0DBC3054}"/>
+                <a16:creationId xmlns:a16="http://schemas.microsoft.com/office/drawing/2014/main" id="{8198FE9E-FD9E-45D1-9F80-E56F0DBC3054}"/>
               </a:ext>
             </a:extLst>
           </p:cNvPr>
@@ -5937,7 +5843,7 @@
           <p:cNvPr id="121" name="TextBox 120">
             <a:extLst>
               <a:ext uri="{FF2B5EF4-FFF2-40B4-BE49-F238E27FC236}">
-                <a16:creationId xmlns:a16="http://schemas.microsoft.com/office/drawing/2014/main" xmlns="" id="{879DEB7D-9AD1-41A2-B595-D2FE87C3B157}"/>
+                <a16:creationId xmlns:a16="http://schemas.microsoft.com/office/drawing/2014/main" id="{879DEB7D-9AD1-41A2-B595-D2FE87C3B157}"/>
               </a:ext>
             </a:extLst>
           </p:cNvPr>
@@ -6002,7 +5908,7 @@
           <p:cNvPr id="122" name="TextBox 121">
             <a:extLst>
               <a:ext uri="{FF2B5EF4-FFF2-40B4-BE49-F238E27FC236}">
-                <a16:creationId xmlns:a16="http://schemas.microsoft.com/office/drawing/2014/main" xmlns="" id="{988937DB-1968-4F78-8A6C-4CA0A41AC1E0}"/>
+                <a16:creationId xmlns:a16="http://schemas.microsoft.com/office/drawing/2014/main" id="{988937DB-1968-4F78-8A6C-4CA0A41AC1E0}"/>
               </a:ext>
             </a:extLst>
           </p:cNvPr>
@@ -6067,7 +5973,7 @@
           <p:cNvPr id="123" name="TextBox 122">
             <a:extLst>
               <a:ext uri="{FF2B5EF4-FFF2-40B4-BE49-F238E27FC236}">
-                <a16:creationId xmlns:a16="http://schemas.microsoft.com/office/drawing/2014/main" xmlns="" id="{3966609F-A5CC-4717-9E59-E3939706409B}"/>
+                <a16:creationId xmlns:a16="http://schemas.microsoft.com/office/drawing/2014/main" id="{3966609F-A5CC-4717-9E59-E3939706409B}"/>
               </a:ext>
             </a:extLst>
           </p:cNvPr>
@@ -6132,7 +6038,7 @@
           <p:cNvPr id="124" name="TextBox 123">
             <a:extLst>
               <a:ext uri="{FF2B5EF4-FFF2-40B4-BE49-F238E27FC236}">
-                <a16:creationId xmlns:a16="http://schemas.microsoft.com/office/drawing/2014/main" xmlns="" id="{B7EDA9D7-C5F9-4836-B579-FBAAC861B1FD}"/>
+                <a16:creationId xmlns:a16="http://schemas.microsoft.com/office/drawing/2014/main" id="{B7EDA9D7-C5F9-4836-B579-FBAAC861B1FD}"/>
               </a:ext>
             </a:extLst>
           </p:cNvPr>
@@ -6197,7 +6103,7 @@
           <p:cNvPr id="125" name="TextBox 124">
             <a:extLst>
               <a:ext uri="{FF2B5EF4-FFF2-40B4-BE49-F238E27FC236}">
-                <a16:creationId xmlns:a16="http://schemas.microsoft.com/office/drawing/2014/main" xmlns="" id="{49B2CE46-3A4C-49AE-8409-291AC08155A5}"/>
+                <a16:creationId xmlns:a16="http://schemas.microsoft.com/office/drawing/2014/main" id="{49B2CE46-3A4C-49AE-8409-291AC08155A5}"/>
               </a:ext>
             </a:extLst>
           </p:cNvPr>
@@ -6273,7 +6179,7 @@
           <p:cNvPr id="127" name="TextBox 126">
             <a:extLst>
               <a:ext uri="{FF2B5EF4-FFF2-40B4-BE49-F238E27FC236}">
-                <a16:creationId xmlns:a16="http://schemas.microsoft.com/office/drawing/2014/main" xmlns="" id="{6B4059C4-8040-4C18-86B2-4DC96191151E}"/>
+                <a16:creationId xmlns:a16="http://schemas.microsoft.com/office/drawing/2014/main" id="{6B4059C4-8040-4C18-86B2-4DC96191151E}"/>
               </a:ext>
             </a:extLst>
           </p:cNvPr>
@@ -6341,6 +6247,349 @@
           </a:p>
         </p:txBody>
       </p:sp>
+      <p:cxnSp>
+        <p:nvCxnSpPr>
+          <p:cNvPr id="2" name="Straight Arrow Connector 1">
+            <a:extLst>
+              <a:ext uri="{FF2B5EF4-FFF2-40B4-BE49-F238E27FC236}">
+                <a16:creationId xmlns:a16="http://schemas.microsoft.com/office/drawing/2014/main" id="{539AD804-B6FA-5FBB-65D4-AF2CEADBF416}"/>
+              </a:ext>
+            </a:extLst>
+          </p:cNvPr>
+          <p:cNvCxnSpPr>
+            <a:cxnSpLocks/>
+          </p:cNvCxnSpPr>
+          <p:nvPr/>
+        </p:nvCxnSpPr>
+        <p:spPr>
+          <a:xfrm flipH="1">
+            <a:off x="2338965" y="3190267"/>
+            <a:ext cx="2396750" cy="25124"/>
+          </a:xfrm>
+          <a:prstGeom prst="straightConnector1">
+            <a:avLst/>
+          </a:prstGeom>
+          <a:noFill/>
+          <a:ln w="28575" cap="flat" cmpd="sng" algn="ctr">
+            <a:solidFill>
+              <a:srgbClr val="F59682"/>
+            </a:solidFill>
+            <a:prstDash val="solid"/>
+            <a:headEnd type="none"/>
+            <a:tailEnd type="triangle"/>
+          </a:ln>
+          <a:effectLst/>
+        </p:spPr>
+      </p:cxnSp>
+      <p:cxnSp>
+        <p:nvCxnSpPr>
+          <p:cNvPr id="10" name="Connector: Elbow 9">
+            <a:extLst>
+              <a:ext uri="{FF2B5EF4-FFF2-40B4-BE49-F238E27FC236}">
+                <a16:creationId xmlns:a16="http://schemas.microsoft.com/office/drawing/2014/main" id="{55BC7067-2B45-411A-AE42-207AAAA2D538}"/>
+              </a:ext>
+            </a:extLst>
+          </p:cNvPr>
+          <p:cNvCxnSpPr>
+            <a:cxnSpLocks/>
+          </p:cNvCxnSpPr>
+          <p:nvPr/>
+        </p:nvCxnSpPr>
+        <p:spPr>
+          <a:xfrm rot="5400000">
+            <a:off x="4735491" y="4349968"/>
+            <a:ext cx="1920241" cy="954178"/>
+          </a:xfrm>
+          <a:prstGeom prst="bentConnector3">
+            <a:avLst>
+              <a:gd name="adj1" fmla="val 99841"/>
+            </a:avLst>
+          </a:prstGeom>
+          <a:noFill/>
+          <a:ln w="28575" cap="flat" cmpd="sng" algn="ctr">
+            <a:solidFill>
+              <a:srgbClr val="F59682"/>
+            </a:solidFill>
+            <a:prstDash val="solid"/>
+            <a:headEnd type="none"/>
+            <a:tailEnd type="triangle"/>
+          </a:ln>
+          <a:effectLst/>
+        </p:spPr>
+      </p:cxnSp>
+      <p:cxnSp>
+        <p:nvCxnSpPr>
+          <p:cNvPr id="73" name="Connector: Elbow 72">
+            <a:extLst>
+              <a:ext uri="{FF2B5EF4-FFF2-40B4-BE49-F238E27FC236}">
+                <a16:creationId xmlns:a16="http://schemas.microsoft.com/office/drawing/2014/main" id="{316E7AA4-7918-13C4-C90E-90FD02CE0A9A}"/>
+              </a:ext>
+            </a:extLst>
+          </p:cNvPr>
+          <p:cNvCxnSpPr>
+            <a:cxnSpLocks/>
+          </p:cNvCxnSpPr>
+          <p:nvPr/>
+        </p:nvCxnSpPr>
+        <p:spPr>
+          <a:xfrm rot="5400000">
+            <a:off x="4308867" y="4399540"/>
+            <a:ext cx="2175139" cy="356991"/>
+          </a:xfrm>
+          <a:prstGeom prst="bentConnector3">
+            <a:avLst>
+              <a:gd name="adj1" fmla="val 99886"/>
+            </a:avLst>
+          </a:prstGeom>
+          <a:noFill/>
+          <a:ln w="28575" cap="flat" cmpd="sng" algn="ctr">
+            <a:solidFill>
+              <a:srgbClr val="F59682"/>
+            </a:solidFill>
+            <a:prstDash val="solid"/>
+            <a:headEnd type="none"/>
+            <a:tailEnd type="triangle"/>
+          </a:ln>
+          <a:effectLst/>
+        </p:spPr>
+      </p:cxnSp>
+      <p:grpSp>
+        <p:nvGrpSpPr>
+          <p:cNvPr id="87" name="Group 86">
+            <a:extLst>
+              <a:ext uri="{FF2B5EF4-FFF2-40B4-BE49-F238E27FC236}">
+                <a16:creationId xmlns:a16="http://schemas.microsoft.com/office/drawing/2014/main" id="{8D23259D-4326-4D56-5A95-0241111CD809}"/>
+              </a:ext>
+            </a:extLst>
+          </p:cNvPr>
+          <p:cNvGrpSpPr/>
+          <p:nvPr/>
+        </p:nvGrpSpPr>
+        <p:grpSpPr>
+          <a:xfrm>
+            <a:off x="1240173" y="5096817"/>
+            <a:ext cx="1564795" cy="590325"/>
+            <a:chOff x="6809718" y="4714918"/>
+            <a:chExt cx="1564795" cy="590325"/>
+          </a:xfrm>
+        </p:grpSpPr>
+        <p:cxnSp>
+          <p:nvCxnSpPr>
+            <p:cNvPr id="80" name="Straight Connector 79">
+              <a:extLst>
+                <a:ext uri="{FF2B5EF4-FFF2-40B4-BE49-F238E27FC236}">
+                  <a16:creationId xmlns:a16="http://schemas.microsoft.com/office/drawing/2014/main" id="{6A6F356F-6E79-3102-3B32-35EB596265C7}"/>
+                </a:ext>
+              </a:extLst>
+            </p:cNvPr>
+            <p:cNvCxnSpPr>
+              <a:cxnSpLocks/>
+            </p:cNvCxnSpPr>
+            <p:nvPr/>
+          </p:nvCxnSpPr>
+          <p:spPr>
+            <a:xfrm flipH="1">
+              <a:off x="6809718" y="4841386"/>
+              <a:ext cx="433764" cy="0"/>
+            </a:xfrm>
+            <a:prstGeom prst="line">
+              <a:avLst/>
+            </a:prstGeom>
+            <a:noFill/>
+            <a:ln w="28575" cap="flat" cmpd="sng" algn="ctr">
+              <a:solidFill>
+                <a:srgbClr val="717D83">
+                  <a:lumMod val="60000"/>
+                  <a:lumOff val="40000"/>
+                </a:srgbClr>
+              </a:solidFill>
+              <a:prstDash val="solid"/>
+              <a:headEnd type="triangle"/>
+            </a:ln>
+            <a:effectLst/>
+          </p:spPr>
+        </p:cxnSp>
+        <p:cxnSp>
+          <p:nvCxnSpPr>
+            <p:cNvPr id="81" name="Straight Arrow Connector 80">
+              <a:extLst>
+                <a:ext uri="{FF2B5EF4-FFF2-40B4-BE49-F238E27FC236}">
+                  <a16:creationId xmlns:a16="http://schemas.microsoft.com/office/drawing/2014/main" id="{21273A4C-C956-7895-790A-C2DD72572735}"/>
+                </a:ext>
+              </a:extLst>
+            </p:cNvPr>
+            <p:cNvCxnSpPr>
+              <a:cxnSpLocks/>
+            </p:cNvCxnSpPr>
+            <p:nvPr/>
+          </p:nvCxnSpPr>
+          <p:spPr>
+            <a:xfrm>
+              <a:off x="6809718" y="5170794"/>
+              <a:ext cx="433764" cy="0"/>
+            </a:xfrm>
+            <a:prstGeom prst="straightConnector1">
+              <a:avLst/>
+            </a:prstGeom>
+            <a:noFill/>
+            <a:ln w="28575" cap="flat" cmpd="sng" algn="ctr">
+              <a:solidFill>
+                <a:srgbClr val="F59682"/>
+              </a:solidFill>
+              <a:prstDash val="solid"/>
+              <a:headEnd type="none"/>
+              <a:tailEnd type="triangle"/>
+            </a:ln>
+            <a:effectLst/>
+          </p:spPr>
+        </p:cxnSp>
+        <p:sp>
+          <p:nvSpPr>
+            <p:cNvPr id="84" name="TextBox 83">
+              <a:extLst>
+                <a:ext uri="{FF2B5EF4-FFF2-40B4-BE49-F238E27FC236}">
+                  <a16:creationId xmlns:a16="http://schemas.microsoft.com/office/drawing/2014/main" id="{B6592859-9AC2-FDE6-566D-56EDF0E6FBA6}"/>
+                </a:ext>
+              </a:extLst>
+            </p:cNvPr>
+            <p:cNvSpPr txBox="1"/>
+            <p:nvPr/>
+          </p:nvSpPr>
+          <p:spPr>
+            <a:xfrm>
+              <a:off x="7172249" y="4714918"/>
+              <a:ext cx="1202264" cy="276999"/>
+            </a:xfrm>
+            <a:prstGeom prst="rect">
+              <a:avLst/>
+            </a:prstGeom>
+            <a:noFill/>
+          </p:spPr>
+          <p:txBody>
+            <a:bodyPr wrap="square" lIns="108000" rIns="108000" rtlCol="0">
+              <a:spAutoFit/>
+            </a:bodyPr>
+            <a:lstStyle/>
+            <a:p>
+              <a:pPr marL="0" marR="0" lvl="0" indent="0" defTabSz="914377" eaLnBrk="1" fontAlgn="auto" latinLnBrk="0" hangingPunct="1">
+                <a:lnSpc>
+                  <a:spcPct val="100000"/>
+                </a:lnSpc>
+                <a:spcBef>
+                  <a:spcPts val="0"/>
+                </a:spcBef>
+                <a:spcAft>
+                  <a:spcPts val="0"/>
+                </a:spcAft>
+                <a:buClrTx/>
+                <a:buSzTx/>
+                <a:buFontTx/>
+                <a:buNone/>
+                <a:tabLst/>
+                <a:defRPr/>
+              </a:pPr>
+              <a:r>
+                <a:rPr lang="en-US" sz="1200" b="1" kern="0" dirty="0">
+                  <a:solidFill>
+                    <a:srgbClr val="4B5357"/>
+                  </a:solidFill>
+                  <a:latin typeface="Source Sans Pro Light" charset="0"/>
+                  <a:ea typeface="Source Sans Pro Light" charset="0"/>
+                  <a:cs typeface="Source Sans Pro Light" charset="0"/>
+                </a:rPr>
+                <a:t>Execution flow</a:t>
+              </a:r>
+              <a:endParaRPr kumimoji="0" lang="en-US" sz="1200" b="1" i="0" u="none" strike="noStrike" kern="0" cap="none" spc="0" normalizeH="0" baseline="0" noProof="0" dirty="0">
+                <a:ln>
+                  <a:noFill/>
+                </a:ln>
+                <a:solidFill>
+                  <a:srgbClr val="4B5357"/>
+                </a:solidFill>
+                <a:effectLst/>
+                <a:uLnTx/>
+                <a:uFillTx/>
+                <a:latin typeface="Source Sans Pro Light" charset="0"/>
+                <a:ea typeface="Source Sans Pro Light" charset="0"/>
+                <a:cs typeface="Source Sans Pro Light" charset="0"/>
+              </a:endParaRPr>
+            </a:p>
+          </p:txBody>
+        </p:sp>
+        <p:sp>
+          <p:nvSpPr>
+            <p:cNvPr id="86" name="TextBox 85">
+              <a:extLst>
+                <a:ext uri="{FF2B5EF4-FFF2-40B4-BE49-F238E27FC236}">
+                  <a16:creationId xmlns:a16="http://schemas.microsoft.com/office/drawing/2014/main" id="{7D2C3DE9-2DCF-B07E-6FF3-8D89E5DBDB4C}"/>
+                </a:ext>
+              </a:extLst>
+            </p:cNvPr>
+            <p:cNvSpPr txBox="1"/>
+            <p:nvPr/>
+          </p:nvSpPr>
+          <p:spPr>
+            <a:xfrm>
+              <a:off x="7172249" y="5028244"/>
+              <a:ext cx="1202264" cy="276999"/>
+            </a:xfrm>
+            <a:prstGeom prst="rect">
+              <a:avLst/>
+            </a:prstGeom>
+            <a:noFill/>
+          </p:spPr>
+          <p:txBody>
+            <a:bodyPr wrap="square" lIns="108000" rIns="108000" rtlCol="0">
+              <a:spAutoFit/>
+            </a:bodyPr>
+            <a:lstStyle/>
+            <a:p>
+              <a:pPr marL="0" marR="0" lvl="0" indent="0" defTabSz="914377" eaLnBrk="1" fontAlgn="auto" latinLnBrk="0" hangingPunct="1">
+                <a:lnSpc>
+                  <a:spcPct val="100000"/>
+                </a:lnSpc>
+                <a:spcBef>
+                  <a:spcPts val="0"/>
+                </a:spcBef>
+                <a:spcAft>
+                  <a:spcPts val="0"/>
+                </a:spcAft>
+                <a:buClrTx/>
+                <a:buSzTx/>
+                <a:buFontTx/>
+                <a:buNone/>
+                <a:tabLst/>
+                <a:defRPr/>
+              </a:pPr>
+              <a:r>
+                <a:rPr lang="en-US" sz="1200" b="1" kern="0" dirty="0">
+                  <a:solidFill>
+                    <a:srgbClr val="4B5357"/>
+                  </a:solidFill>
+                  <a:latin typeface="Source Sans Pro Light" charset="0"/>
+                  <a:ea typeface="Source Sans Pro Light" charset="0"/>
+                  <a:cs typeface="Source Sans Pro Light" charset="0"/>
+                </a:rPr>
+                <a:t>Pointer</a:t>
+              </a:r>
+              <a:endParaRPr kumimoji="0" lang="en-US" sz="1200" b="1" i="0" u="none" strike="noStrike" kern="0" cap="none" spc="0" normalizeH="0" baseline="0" noProof="0" dirty="0">
+                <a:ln>
+                  <a:noFill/>
+                </a:ln>
+                <a:solidFill>
+                  <a:srgbClr val="4B5357"/>
+                </a:solidFill>
+                <a:effectLst/>
+                <a:uLnTx/>
+                <a:uFillTx/>
+                <a:latin typeface="Source Sans Pro Light" charset="0"/>
+                <a:ea typeface="Source Sans Pro Light" charset="0"/>
+                <a:cs typeface="Source Sans Pro Light" charset="0"/>
+              </a:endParaRPr>
+            </a:p>
+          </p:txBody>
+        </p:sp>
+      </p:grpSp>
     </p:spTree>
     <p:extLst>
       <p:ext uri="{BB962C8B-B14F-4D97-AF65-F5344CB8AC3E}">

</xml_diff>